<commit_message>
Complete draft slide decks
</commit_message>
<xml_diff>
--- a/Aus Household Consumption and Expenditure Pattern.pptx
+++ b/Aus Household Consumption and Expenditure Pattern.pptx
@@ -4,20 +4,25 @@
   <p:sldMasterIdLst>
     <p:sldMasterId id="2147483648" r:id="rId1"/>
   </p:sldMasterIdLst>
+  <p:notesMasterIdLst>
+    <p:notesMasterId r:id="rId17"/>
+  </p:notesMasterIdLst>
   <p:sldIdLst>
     <p:sldId id="256" r:id="rId2"/>
     <p:sldId id="257" r:id="rId3"/>
     <p:sldId id="266" r:id="rId4"/>
     <p:sldId id="269" r:id="rId5"/>
-    <p:sldId id="265" r:id="rId6"/>
-    <p:sldId id="267" r:id="rId7"/>
-    <p:sldId id="268" r:id="rId8"/>
-    <p:sldId id="264" r:id="rId9"/>
-    <p:sldId id="270" r:id="rId10"/>
-    <p:sldId id="271" r:id="rId11"/>
-    <p:sldId id="262" r:id="rId12"/>
-    <p:sldId id="258" r:id="rId13"/>
-    <p:sldId id="259" r:id="rId14"/>
+    <p:sldId id="273" r:id="rId6"/>
+    <p:sldId id="274" r:id="rId7"/>
+    <p:sldId id="265" r:id="rId8"/>
+    <p:sldId id="267" r:id="rId9"/>
+    <p:sldId id="268" r:id="rId10"/>
+    <p:sldId id="264" r:id="rId11"/>
+    <p:sldId id="270" r:id="rId12"/>
+    <p:sldId id="271" r:id="rId13"/>
+    <p:sldId id="262" r:id="rId14"/>
+    <p:sldId id="258" r:id="rId15"/>
+    <p:sldId id="259" r:id="rId16"/>
   </p:sldIdLst>
   <p:sldSz cx="12192000" cy="6858000"/>
   <p:notesSz cx="6858000" cy="9144000"/>
@@ -124,6 +129,830 @@
 </p:presentation>
 </file>
 
+<file path=ppt/notesMasters/notesMaster1.xml><?xml version="1.0" encoding="utf-8"?>
+<p:notesMaster xmlns:a="http://schemas.openxmlformats.org/drawingml/2006/main" xmlns:r="http://schemas.openxmlformats.org/officeDocument/2006/relationships" xmlns:p="http://schemas.openxmlformats.org/presentationml/2006/main">
+  <p:cSld>
+    <p:bg>
+      <p:bgRef idx="1001">
+        <a:schemeClr val="bg1"/>
+      </p:bgRef>
+    </p:bg>
+    <p:spTree>
+      <p:nvGrpSpPr>
+        <p:cNvPr id="1" name=""/>
+        <p:cNvGrpSpPr/>
+        <p:nvPr/>
+      </p:nvGrpSpPr>
+      <p:grpSpPr>
+        <a:xfrm>
+          <a:off x="0" y="0"/>
+          <a:ext cx="0" cy="0"/>
+          <a:chOff x="0" y="0"/>
+          <a:chExt cx="0" cy="0"/>
+        </a:xfrm>
+      </p:grpSpPr>
+      <p:sp>
+        <p:nvSpPr>
+          <p:cNvPr id="2" name="Header Placeholder 1"/>
+          <p:cNvSpPr>
+            <a:spLocks noGrp="1"/>
+          </p:cNvSpPr>
+          <p:nvPr>
+            <p:ph type="hdr" sz="quarter"/>
+          </p:nvPr>
+        </p:nvSpPr>
+        <p:spPr>
+          <a:xfrm>
+            <a:off x="0" y="0"/>
+            <a:ext cx="2971800" cy="458788"/>
+          </a:xfrm>
+          <a:prstGeom prst="rect">
+            <a:avLst/>
+          </a:prstGeom>
+        </p:spPr>
+        <p:txBody>
+          <a:bodyPr vert="horz" lIns="91440" tIns="45720" rIns="91440" bIns="45720" rtlCol="0"/>
+          <a:lstStyle>
+            <a:lvl1pPr algn="l">
+              <a:defRPr sz="1200"/>
+            </a:lvl1pPr>
+          </a:lstStyle>
+          <a:p>
+            <a:endParaRPr lang="en-AU"/>
+          </a:p>
+        </p:txBody>
+      </p:sp>
+      <p:sp>
+        <p:nvSpPr>
+          <p:cNvPr id="3" name="Date Placeholder 2"/>
+          <p:cNvSpPr>
+            <a:spLocks noGrp="1"/>
+          </p:cNvSpPr>
+          <p:nvPr>
+            <p:ph type="dt" idx="1"/>
+          </p:nvPr>
+        </p:nvSpPr>
+        <p:spPr>
+          <a:xfrm>
+            <a:off x="3884613" y="0"/>
+            <a:ext cx="2971800" cy="458788"/>
+          </a:xfrm>
+          <a:prstGeom prst="rect">
+            <a:avLst/>
+          </a:prstGeom>
+        </p:spPr>
+        <p:txBody>
+          <a:bodyPr vert="horz" lIns="91440" tIns="45720" rIns="91440" bIns="45720" rtlCol="0"/>
+          <a:lstStyle>
+            <a:lvl1pPr algn="r">
+              <a:defRPr sz="1200"/>
+            </a:lvl1pPr>
+          </a:lstStyle>
+          <a:p>
+            <a:fld id="{085AB6A5-4C4F-4CE3-8DC9-20B93F34AA82}" type="datetimeFigureOut">
+              <a:rPr lang="en-AU" smtClean="0"/>
+              <a:t>1/11/2022</a:t>
+            </a:fld>
+            <a:endParaRPr lang="en-AU"/>
+          </a:p>
+        </p:txBody>
+      </p:sp>
+      <p:sp>
+        <p:nvSpPr>
+          <p:cNvPr id="4" name="Slide Image Placeholder 3"/>
+          <p:cNvSpPr>
+            <a:spLocks noGrp="1" noRot="1" noChangeAspect="1"/>
+          </p:cNvSpPr>
+          <p:nvPr>
+            <p:ph type="sldImg" idx="2"/>
+          </p:nvPr>
+        </p:nvSpPr>
+        <p:spPr>
+          <a:xfrm>
+            <a:off x="685800" y="1143000"/>
+            <a:ext cx="5486400" cy="3086100"/>
+          </a:xfrm>
+          <a:prstGeom prst="rect">
+            <a:avLst/>
+          </a:prstGeom>
+          <a:noFill/>
+          <a:ln w="12700">
+            <a:solidFill>
+              <a:prstClr val="black"/>
+            </a:solidFill>
+          </a:ln>
+        </p:spPr>
+        <p:txBody>
+          <a:bodyPr vert="horz" lIns="91440" tIns="45720" rIns="91440" bIns="45720" rtlCol="0" anchor="ctr"/>
+          <a:lstStyle/>
+          <a:p>
+            <a:endParaRPr lang="en-AU"/>
+          </a:p>
+        </p:txBody>
+      </p:sp>
+      <p:sp>
+        <p:nvSpPr>
+          <p:cNvPr id="5" name="Notes Placeholder 4"/>
+          <p:cNvSpPr>
+            <a:spLocks noGrp="1"/>
+          </p:cNvSpPr>
+          <p:nvPr>
+            <p:ph type="body" sz="quarter" idx="3"/>
+          </p:nvPr>
+        </p:nvSpPr>
+        <p:spPr>
+          <a:xfrm>
+            <a:off x="685800" y="4400550"/>
+            <a:ext cx="5486400" cy="3600450"/>
+          </a:xfrm>
+          <a:prstGeom prst="rect">
+            <a:avLst/>
+          </a:prstGeom>
+        </p:spPr>
+        <p:txBody>
+          <a:bodyPr vert="horz" lIns="91440" tIns="45720" rIns="91440" bIns="45720" rtlCol="0"/>
+          <a:lstStyle/>
+          <a:p>
+            <a:pPr lvl="0"/>
+            <a:r>
+              <a:rPr lang="en-US"/>
+              <a:t>Click to edit Master text styles</a:t>
+            </a:r>
+          </a:p>
+          <a:p>
+            <a:pPr lvl="1"/>
+            <a:r>
+              <a:rPr lang="en-US"/>
+              <a:t>Second level</a:t>
+            </a:r>
+          </a:p>
+          <a:p>
+            <a:pPr lvl="2"/>
+            <a:r>
+              <a:rPr lang="en-US"/>
+              <a:t>Third level</a:t>
+            </a:r>
+          </a:p>
+          <a:p>
+            <a:pPr lvl="3"/>
+            <a:r>
+              <a:rPr lang="en-US"/>
+              <a:t>Fourth level</a:t>
+            </a:r>
+          </a:p>
+          <a:p>
+            <a:pPr lvl="4"/>
+            <a:r>
+              <a:rPr lang="en-US"/>
+              <a:t>Fifth level</a:t>
+            </a:r>
+            <a:endParaRPr lang="en-AU"/>
+          </a:p>
+        </p:txBody>
+      </p:sp>
+      <p:sp>
+        <p:nvSpPr>
+          <p:cNvPr id="6" name="Footer Placeholder 5"/>
+          <p:cNvSpPr>
+            <a:spLocks noGrp="1"/>
+          </p:cNvSpPr>
+          <p:nvPr>
+            <p:ph type="ftr" sz="quarter" idx="4"/>
+          </p:nvPr>
+        </p:nvSpPr>
+        <p:spPr>
+          <a:xfrm>
+            <a:off x="0" y="8685213"/>
+            <a:ext cx="2971800" cy="458787"/>
+          </a:xfrm>
+          <a:prstGeom prst="rect">
+            <a:avLst/>
+          </a:prstGeom>
+        </p:spPr>
+        <p:txBody>
+          <a:bodyPr vert="horz" lIns="91440" tIns="45720" rIns="91440" bIns="45720" rtlCol="0" anchor="b"/>
+          <a:lstStyle>
+            <a:lvl1pPr algn="l">
+              <a:defRPr sz="1200"/>
+            </a:lvl1pPr>
+          </a:lstStyle>
+          <a:p>
+            <a:endParaRPr lang="en-AU"/>
+          </a:p>
+        </p:txBody>
+      </p:sp>
+      <p:sp>
+        <p:nvSpPr>
+          <p:cNvPr id="7" name="Slide Number Placeholder 6"/>
+          <p:cNvSpPr>
+            <a:spLocks noGrp="1"/>
+          </p:cNvSpPr>
+          <p:nvPr>
+            <p:ph type="sldNum" sz="quarter" idx="5"/>
+          </p:nvPr>
+        </p:nvSpPr>
+        <p:spPr>
+          <a:xfrm>
+            <a:off x="3884613" y="8685213"/>
+            <a:ext cx="2971800" cy="458787"/>
+          </a:xfrm>
+          <a:prstGeom prst="rect">
+            <a:avLst/>
+          </a:prstGeom>
+        </p:spPr>
+        <p:txBody>
+          <a:bodyPr vert="horz" lIns="91440" tIns="45720" rIns="91440" bIns="45720" rtlCol="0" anchor="b"/>
+          <a:lstStyle>
+            <a:lvl1pPr algn="r">
+              <a:defRPr sz="1200"/>
+            </a:lvl1pPr>
+          </a:lstStyle>
+          <a:p>
+            <a:fld id="{FA398F04-D846-47DF-AB7C-28D61D896A9C}" type="slidenum">
+              <a:rPr lang="en-AU" smtClean="0"/>
+              <a:t>‹#›</a:t>
+            </a:fld>
+            <a:endParaRPr lang="en-AU"/>
+          </a:p>
+        </p:txBody>
+      </p:sp>
+    </p:spTree>
+    <p:extLst>
+      <p:ext uri="{BB962C8B-B14F-4D97-AF65-F5344CB8AC3E}">
+        <p14:creationId xmlns:p14="http://schemas.microsoft.com/office/powerpoint/2010/main" val="3807117033"/>
+      </p:ext>
+    </p:extLst>
+  </p:cSld>
+  <p:clrMap bg1="lt1" tx1="dk1" bg2="lt2" tx2="dk2" accent1="accent1" accent2="accent2" accent3="accent3" accent4="accent4" accent5="accent5" accent6="accent6" hlink="hlink" folHlink="folHlink"/>
+  <p:notesStyle>
+    <a:lvl1pPr marL="0" algn="l" defTabSz="914400" rtl="0" eaLnBrk="1" latinLnBrk="0" hangingPunct="1">
+      <a:defRPr sz="1200" kern="1200">
+        <a:solidFill>
+          <a:schemeClr val="tx1"/>
+        </a:solidFill>
+        <a:latin typeface="+mn-lt"/>
+        <a:ea typeface="+mn-ea"/>
+        <a:cs typeface="+mn-cs"/>
+      </a:defRPr>
+    </a:lvl1pPr>
+    <a:lvl2pPr marL="457200" algn="l" defTabSz="914400" rtl="0" eaLnBrk="1" latinLnBrk="0" hangingPunct="1">
+      <a:defRPr sz="1200" kern="1200">
+        <a:solidFill>
+          <a:schemeClr val="tx1"/>
+        </a:solidFill>
+        <a:latin typeface="+mn-lt"/>
+        <a:ea typeface="+mn-ea"/>
+        <a:cs typeface="+mn-cs"/>
+      </a:defRPr>
+    </a:lvl2pPr>
+    <a:lvl3pPr marL="914400" algn="l" defTabSz="914400" rtl="0" eaLnBrk="1" latinLnBrk="0" hangingPunct="1">
+      <a:defRPr sz="1200" kern="1200">
+        <a:solidFill>
+          <a:schemeClr val="tx1"/>
+        </a:solidFill>
+        <a:latin typeface="+mn-lt"/>
+        <a:ea typeface="+mn-ea"/>
+        <a:cs typeface="+mn-cs"/>
+      </a:defRPr>
+    </a:lvl3pPr>
+    <a:lvl4pPr marL="1371600" algn="l" defTabSz="914400" rtl="0" eaLnBrk="1" latinLnBrk="0" hangingPunct="1">
+      <a:defRPr sz="1200" kern="1200">
+        <a:solidFill>
+          <a:schemeClr val="tx1"/>
+        </a:solidFill>
+        <a:latin typeface="+mn-lt"/>
+        <a:ea typeface="+mn-ea"/>
+        <a:cs typeface="+mn-cs"/>
+      </a:defRPr>
+    </a:lvl4pPr>
+    <a:lvl5pPr marL="1828800" algn="l" defTabSz="914400" rtl="0" eaLnBrk="1" latinLnBrk="0" hangingPunct="1">
+      <a:defRPr sz="1200" kern="1200">
+        <a:solidFill>
+          <a:schemeClr val="tx1"/>
+        </a:solidFill>
+        <a:latin typeface="+mn-lt"/>
+        <a:ea typeface="+mn-ea"/>
+        <a:cs typeface="+mn-cs"/>
+      </a:defRPr>
+    </a:lvl5pPr>
+    <a:lvl6pPr marL="2286000" algn="l" defTabSz="914400" rtl="0" eaLnBrk="1" latinLnBrk="0" hangingPunct="1">
+      <a:defRPr sz="1200" kern="1200">
+        <a:solidFill>
+          <a:schemeClr val="tx1"/>
+        </a:solidFill>
+        <a:latin typeface="+mn-lt"/>
+        <a:ea typeface="+mn-ea"/>
+        <a:cs typeface="+mn-cs"/>
+      </a:defRPr>
+    </a:lvl6pPr>
+    <a:lvl7pPr marL="2743200" algn="l" defTabSz="914400" rtl="0" eaLnBrk="1" latinLnBrk="0" hangingPunct="1">
+      <a:defRPr sz="1200" kern="1200">
+        <a:solidFill>
+          <a:schemeClr val="tx1"/>
+        </a:solidFill>
+        <a:latin typeface="+mn-lt"/>
+        <a:ea typeface="+mn-ea"/>
+        <a:cs typeface="+mn-cs"/>
+      </a:defRPr>
+    </a:lvl7pPr>
+    <a:lvl8pPr marL="3200400" algn="l" defTabSz="914400" rtl="0" eaLnBrk="1" latinLnBrk="0" hangingPunct="1">
+      <a:defRPr sz="1200" kern="1200">
+        <a:solidFill>
+          <a:schemeClr val="tx1"/>
+        </a:solidFill>
+        <a:latin typeface="+mn-lt"/>
+        <a:ea typeface="+mn-ea"/>
+        <a:cs typeface="+mn-cs"/>
+      </a:defRPr>
+    </a:lvl8pPr>
+    <a:lvl9pPr marL="3657600" algn="l" defTabSz="914400" rtl="0" eaLnBrk="1" latinLnBrk="0" hangingPunct="1">
+      <a:defRPr sz="1200" kern="1200">
+        <a:solidFill>
+          <a:schemeClr val="tx1"/>
+        </a:solidFill>
+        <a:latin typeface="+mn-lt"/>
+        <a:ea typeface="+mn-ea"/>
+        <a:cs typeface="+mn-cs"/>
+      </a:defRPr>
+    </a:lvl9pPr>
+  </p:notesStyle>
+</p:notesMaster>
+</file>
+
+<file path=ppt/notesSlides/notesSlide1.xml><?xml version="1.0" encoding="utf-8"?>
+<p:notes xmlns:a="http://schemas.openxmlformats.org/drawingml/2006/main" xmlns:r="http://schemas.openxmlformats.org/officeDocument/2006/relationships" xmlns:p="http://schemas.openxmlformats.org/presentationml/2006/main">
+  <p:cSld>
+    <p:spTree>
+      <p:nvGrpSpPr>
+        <p:cNvPr id="1" name=""/>
+        <p:cNvGrpSpPr/>
+        <p:nvPr/>
+      </p:nvGrpSpPr>
+      <p:grpSpPr>
+        <a:xfrm>
+          <a:off x="0" y="0"/>
+          <a:ext cx="0" cy="0"/>
+          <a:chOff x="0" y="0"/>
+          <a:chExt cx="0" cy="0"/>
+        </a:xfrm>
+      </p:grpSpPr>
+      <p:sp>
+        <p:nvSpPr>
+          <p:cNvPr id="2" name="Slide Image Placeholder 1"/>
+          <p:cNvSpPr>
+            <a:spLocks noGrp="1" noRot="1" noChangeAspect="1"/>
+          </p:cNvSpPr>
+          <p:nvPr>
+            <p:ph type="sldImg"/>
+          </p:nvPr>
+        </p:nvSpPr>
+        <p:spPr/>
+      </p:sp>
+      <p:sp>
+        <p:nvSpPr>
+          <p:cNvPr id="3" name="Notes Placeholder 2"/>
+          <p:cNvSpPr>
+            <a:spLocks noGrp="1"/>
+          </p:cNvSpPr>
+          <p:nvPr>
+            <p:ph type="body" idx="1"/>
+          </p:nvPr>
+        </p:nvSpPr>
+        <p:spPr/>
+        <p:txBody>
+          <a:bodyPr/>
+          <a:lstStyle/>
+          <a:p>
+            <a:endParaRPr lang="en-AU" dirty="0"/>
+          </a:p>
+        </p:txBody>
+      </p:sp>
+      <p:sp>
+        <p:nvSpPr>
+          <p:cNvPr id="4" name="Slide Number Placeholder 3"/>
+          <p:cNvSpPr>
+            <a:spLocks noGrp="1"/>
+          </p:cNvSpPr>
+          <p:nvPr>
+            <p:ph type="sldNum" sz="quarter" idx="5"/>
+          </p:nvPr>
+        </p:nvSpPr>
+        <p:spPr/>
+        <p:txBody>
+          <a:bodyPr/>
+          <a:lstStyle/>
+          <a:p>
+            <a:fld id="{FA398F04-D846-47DF-AB7C-28D61D896A9C}" type="slidenum">
+              <a:rPr lang="en-AU" smtClean="0"/>
+              <a:t>6</a:t>
+            </a:fld>
+            <a:endParaRPr lang="en-AU"/>
+          </a:p>
+        </p:txBody>
+      </p:sp>
+    </p:spTree>
+    <p:extLst>
+      <p:ext uri="{BB962C8B-B14F-4D97-AF65-F5344CB8AC3E}">
+        <p14:creationId xmlns:p14="http://schemas.microsoft.com/office/powerpoint/2010/main" val="1238906103"/>
+      </p:ext>
+    </p:extLst>
+  </p:cSld>
+  <p:clrMapOvr>
+    <a:masterClrMapping/>
+  </p:clrMapOvr>
+</p:notes>
+</file>
+
+<file path=ppt/notesSlides/notesSlide2.xml><?xml version="1.0" encoding="utf-8"?>
+<p:notes xmlns:a="http://schemas.openxmlformats.org/drawingml/2006/main" xmlns:r="http://schemas.openxmlformats.org/officeDocument/2006/relationships" xmlns:p="http://schemas.openxmlformats.org/presentationml/2006/main">
+  <p:cSld>
+    <p:spTree>
+      <p:nvGrpSpPr>
+        <p:cNvPr id="1" name=""/>
+        <p:cNvGrpSpPr/>
+        <p:nvPr/>
+      </p:nvGrpSpPr>
+      <p:grpSpPr>
+        <a:xfrm>
+          <a:off x="0" y="0"/>
+          <a:ext cx="0" cy="0"/>
+          <a:chOff x="0" y="0"/>
+          <a:chExt cx="0" cy="0"/>
+        </a:xfrm>
+      </p:grpSpPr>
+      <p:sp>
+        <p:nvSpPr>
+          <p:cNvPr id="2" name="Slide Image Placeholder 1"/>
+          <p:cNvSpPr>
+            <a:spLocks noGrp="1" noRot="1" noChangeAspect="1"/>
+          </p:cNvSpPr>
+          <p:nvPr>
+            <p:ph type="sldImg"/>
+          </p:nvPr>
+        </p:nvSpPr>
+        <p:spPr/>
+      </p:sp>
+      <p:sp>
+        <p:nvSpPr>
+          <p:cNvPr id="3" name="Notes Placeholder 2"/>
+          <p:cNvSpPr>
+            <a:spLocks noGrp="1"/>
+          </p:cNvSpPr>
+          <p:nvPr>
+            <p:ph type="body" idx="1"/>
+          </p:nvPr>
+        </p:nvSpPr>
+        <p:spPr/>
+        <p:txBody>
+          <a:bodyPr/>
+          <a:lstStyle/>
+          <a:p>
+            <a:r>
+              <a:rPr lang="en-AU" dirty="0"/>
+              <a:t>Talking Point:</a:t>
+            </a:r>
+          </a:p>
+          <a:p>
+            <a:pPr marL="171450" indent="-171450">
+              <a:buFont typeface="Arial" panose="020B0604020202020204" pitchFamily="34" charset="0"/>
+              <a:buChar char="•"/>
+            </a:pPr>
+            <a:r>
+              <a:rPr lang="en-AU" dirty="0"/>
+              <a:t>We observe an increasing trend in the household spending from 2012 – 2018.</a:t>
+            </a:r>
+          </a:p>
+          <a:p>
+            <a:pPr marL="171450" indent="-171450">
+              <a:buFont typeface="Arial" panose="020B0604020202020204" pitchFamily="34" charset="0"/>
+              <a:buChar char="•"/>
+            </a:pPr>
+            <a:r>
+              <a:rPr lang="en-AU" dirty="0"/>
+              <a:t>In 2018 – 2019, the increase in spending seems to be plateauing.</a:t>
+            </a:r>
+          </a:p>
+          <a:p>
+            <a:pPr marL="171450" indent="-171450">
+              <a:buFont typeface="Arial" panose="020B0604020202020204" pitchFamily="34" charset="0"/>
+              <a:buChar char="•"/>
+            </a:pPr>
+            <a:r>
+              <a:rPr lang="en-AU" dirty="0"/>
+              <a:t>If you remember once upon a time, there is this virus named Coronavirus.  In late Q1 2020, Australia went into mandatory lockdown.</a:t>
+            </a:r>
+            <a:br>
+              <a:rPr lang="en-AU" dirty="0"/>
+            </a:br>
+            <a:r>
+              <a:rPr lang="en-AU" dirty="0"/>
+              <a:t>We can see a material decline in consumption and expenditure.</a:t>
+            </a:r>
+          </a:p>
+          <a:p>
+            <a:pPr marL="171450" indent="-171450">
+              <a:buFont typeface="Arial" panose="020B0604020202020204" pitchFamily="34" charset="0"/>
+              <a:buChar char="•"/>
+            </a:pPr>
+            <a:r>
+              <a:rPr lang="en-AU" dirty="0"/>
+              <a:t>As government lift restrictions, we see the spending increase again. </a:t>
+            </a:r>
+          </a:p>
+          <a:p>
+            <a:pPr marL="171450" indent="-171450">
+              <a:buFont typeface="Arial" panose="020B0604020202020204" pitchFamily="34" charset="0"/>
+              <a:buChar char="•"/>
+            </a:pPr>
+            <a:r>
+              <a:rPr lang="en-AU" dirty="0"/>
+              <a:t>The second dip in mid 2021 is highly likely as a result of Delta variant stimulated lockdown.</a:t>
+            </a:r>
+          </a:p>
+          <a:p>
+            <a:pPr marL="171450" indent="-171450">
+              <a:buFont typeface="Arial" panose="020B0604020202020204" pitchFamily="34" charset="0"/>
+              <a:buChar char="•"/>
+            </a:pPr>
+            <a:r>
+              <a:rPr lang="en-AU" dirty="0"/>
+              <a:t>Oct 2021 As we transition to endemic stage / emerge out from pandemic, we see a steep increase in consumption.</a:t>
+            </a:r>
+          </a:p>
+          <a:p>
+            <a:pPr marL="171450" indent="-171450">
+              <a:buFont typeface="Arial" panose="020B0604020202020204" pitchFamily="34" charset="0"/>
+              <a:buChar char="•"/>
+            </a:pPr>
+            <a:endParaRPr lang="en-AU" dirty="0"/>
+          </a:p>
+          <a:p>
+            <a:pPr marL="0" indent="0">
+              <a:buFont typeface="Arial" panose="020B0604020202020204" pitchFamily="34" charset="0"/>
+              <a:buNone/>
+            </a:pPr>
+            <a:endParaRPr lang="en-AU" dirty="0"/>
+          </a:p>
+        </p:txBody>
+      </p:sp>
+      <p:sp>
+        <p:nvSpPr>
+          <p:cNvPr id="4" name="Slide Number Placeholder 3"/>
+          <p:cNvSpPr>
+            <a:spLocks noGrp="1"/>
+          </p:cNvSpPr>
+          <p:nvPr>
+            <p:ph type="sldNum" sz="quarter" idx="5"/>
+          </p:nvPr>
+        </p:nvSpPr>
+        <p:spPr/>
+        <p:txBody>
+          <a:bodyPr/>
+          <a:lstStyle/>
+          <a:p>
+            <a:fld id="{FA398F04-D846-47DF-AB7C-28D61D896A9C}" type="slidenum">
+              <a:rPr lang="en-AU" smtClean="0"/>
+              <a:t>7</a:t>
+            </a:fld>
+            <a:endParaRPr lang="en-AU"/>
+          </a:p>
+        </p:txBody>
+      </p:sp>
+    </p:spTree>
+    <p:extLst>
+      <p:ext uri="{BB962C8B-B14F-4D97-AF65-F5344CB8AC3E}">
+        <p14:creationId xmlns:p14="http://schemas.microsoft.com/office/powerpoint/2010/main" val="2896517649"/>
+      </p:ext>
+    </p:extLst>
+  </p:cSld>
+  <p:clrMapOvr>
+    <a:masterClrMapping/>
+  </p:clrMapOvr>
+</p:notes>
+</file>
+
+<file path=ppt/notesSlides/notesSlide3.xml><?xml version="1.0" encoding="utf-8"?>
+<p:notes xmlns:a="http://schemas.openxmlformats.org/drawingml/2006/main" xmlns:r="http://schemas.openxmlformats.org/officeDocument/2006/relationships" xmlns:p="http://schemas.openxmlformats.org/presentationml/2006/main">
+  <p:cSld>
+    <p:spTree>
+      <p:nvGrpSpPr>
+        <p:cNvPr id="1" name=""/>
+        <p:cNvGrpSpPr/>
+        <p:nvPr/>
+      </p:nvGrpSpPr>
+      <p:grpSpPr>
+        <a:xfrm>
+          <a:off x="0" y="0"/>
+          <a:ext cx="0" cy="0"/>
+          <a:chOff x="0" y="0"/>
+          <a:chExt cx="0" cy="0"/>
+        </a:xfrm>
+      </p:grpSpPr>
+      <p:sp>
+        <p:nvSpPr>
+          <p:cNvPr id="2" name="Slide Image Placeholder 1"/>
+          <p:cNvSpPr>
+            <a:spLocks noGrp="1" noRot="1" noChangeAspect="1"/>
+          </p:cNvSpPr>
+          <p:nvPr>
+            <p:ph type="sldImg"/>
+          </p:nvPr>
+        </p:nvSpPr>
+        <p:spPr/>
+      </p:sp>
+      <p:sp>
+        <p:nvSpPr>
+          <p:cNvPr id="3" name="Notes Placeholder 2"/>
+          <p:cNvSpPr>
+            <a:spLocks noGrp="1"/>
+          </p:cNvSpPr>
+          <p:nvPr>
+            <p:ph type="body" idx="1"/>
+          </p:nvPr>
+        </p:nvSpPr>
+        <p:spPr/>
+        <p:txBody>
+          <a:bodyPr/>
+          <a:lstStyle/>
+          <a:p>
+            <a:endParaRPr lang="en-AU" dirty="0"/>
+          </a:p>
+        </p:txBody>
+      </p:sp>
+      <p:sp>
+        <p:nvSpPr>
+          <p:cNvPr id="4" name="Slide Number Placeholder 3"/>
+          <p:cNvSpPr>
+            <a:spLocks noGrp="1"/>
+          </p:cNvSpPr>
+          <p:nvPr>
+            <p:ph type="sldNum" sz="quarter" idx="5"/>
+          </p:nvPr>
+        </p:nvSpPr>
+        <p:spPr/>
+        <p:txBody>
+          <a:bodyPr/>
+          <a:lstStyle/>
+          <a:p>
+            <a:fld id="{FA398F04-D846-47DF-AB7C-28D61D896A9C}" type="slidenum">
+              <a:rPr lang="en-AU" smtClean="0"/>
+              <a:t>8</a:t>
+            </a:fld>
+            <a:endParaRPr lang="en-AU"/>
+          </a:p>
+        </p:txBody>
+      </p:sp>
+    </p:spTree>
+    <p:extLst>
+      <p:ext uri="{BB962C8B-B14F-4D97-AF65-F5344CB8AC3E}">
+        <p14:creationId xmlns:p14="http://schemas.microsoft.com/office/powerpoint/2010/main" val="803720203"/>
+      </p:ext>
+    </p:extLst>
+  </p:cSld>
+  <p:clrMapOvr>
+    <a:masterClrMapping/>
+  </p:clrMapOvr>
+</p:notes>
+</file>
+
+<file path=ppt/notesSlides/notesSlide4.xml><?xml version="1.0" encoding="utf-8"?>
+<p:notes xmlns:a="http://schemas.openxmlformats.org/drawingml/2006/main" xmlns:r="http://schemas.openxmlformats.org/officeDocument/2006/relationships" xmlns:p="http://schemas.openxmlformats.org/presentationml/2006/main">
+  <p:cSld>
+    <p:spTree>
+      <p:nvGrpSpPr>
+        <p:cNvPr id="1" name=""/>
+        <p:cNvGrpSpPr/>
+        <p:nvPr/>
+      </p:nvGrpSpPr>
+      <p:grpSpPr>
+        <a:xfrm>
+          <a:off x="0" y="0"/>
+          <a:ext cx="0" cy="0"/>
+          <a:chOff x="0" y="0"/>
+          <a:chExt cx="0" cy="0"/>
+        </a:xfrm>
+      </p:grpSpPr>
+      <p:sp>
+        <p:nvSpPr>
+          <p:cNvPr id="2" name="Slide Image Placeholder 1"/>
+          <p:cNvSpPr>
+            <a:spLocks noGrp="1" noRot="1" noChangeAspect="1"/>
+          </p:cNvSpPr>
+          <p:nvPr>
+            <p:ph type="sldImg"/>
+          </p:nvPr>
+        </p:nvSpPr>
+        <p:spPr/>
+      </p:sp>
+      <p:sp>
+        <p:nvSpPr>
+          <p:cNvPr id="3" name="Notes Placeholder 2"/>
+          <p:cNvSpPr>
+            <a:spLocks noGrp="1"/>
+          </p:cNvSpPr>
+          <p:nvPr>
+            <p:ph type="body" idx="1"/>
+          </p:nvPr>
+        </p:nvSpPr>
+        <p:spPr/>
+        <p:txBody>
+          <a:bodyPr/>
+          <a:lstStyle/>
+          <a:p>
+            <a:r>
+              <a:rPr lang="en-AU" dirty="0"/>
+              <a:t>What are some the possible explanation</a:t>
+            </a:r>
+          </a:p>
+          <a:p>
+            <a:pPr marL="228600" indent="-228600">
+              <a:buAutoNum type="arabicPeriod"/>
+            </a:pPr>
+            <a:r>
+              <a:rPr lang="en-AU" dirty="0"/>
+              <a:t>Covid stimulated changes.</a:t>
+            </a:r>
+          </a:p>
+          <a:p>
+            <a:pPr marL="0" indent="0">
+              <a:buNone/>
+            </a:pPr>
+            <a:r>
+              <a:rPr lang="en-AU" dirty="0"/>
+              <a:t>Rent – looking for bigger place as ppl recognise the need for space as a result of working from home, home-schooling</a:t>
+            </a:r>
+          </a:p>
+          <a:p>
+            <a:pPr marL="0" indent="0">
+              <a:buNone/>
+            </a:pPr>
+            <a:r>
+              <a:rPr lang="en-AU" dirty="0"/>
+              <a:t>Food – no where else to spend???</a:t>
+            </a:r>
+          </a:p>
+          <a:p>
+            <a:pPr marL="0" indent="0">
+              <a:buNone/>
+            </a:pPr>
+            <a:r>
+              <a:rPr lang="en-AU" dirty="0"/>
+              <a:t>Education – retraining?? As ppl lost their jobs</a:t>
+            </a:r>
+          </a:p>
+          <a:p>
+            <a:pPr marL="0" indent="0">
+              <a:buNone/>
+            </a:pPr>
+            <a:r>
+              <a:rPr lang="en-AU" dirty="0"/>
+              <a:t>Transport / hotel and eating out– no surprises. Travel restrictions (i.e. 5km radius/ 10km radius) and mandatory lockdown</a:t>
+            </a:r>
+          </a:p>
+          <a:p>
+            <a:pPr marL="0" indent="0">
+              <a:buNone/>
+            </a:pPr>
+            <a:endParaRPr lang="en-AU" dirty="0"/>
+          </a:p>
+        </p:txBody>
+      </p:sp>
+      <p:sp>
+        <p:nvSpPr>
+          <p:cNvPr id="4" name="Slide Number Placeholder 3"/>
+          <p:cNvSpPr>
+            <a:spLocks noGrp="1"/>
+          </p:cNvSpPr>
+          <p:nvPr>
+            <p:ph type="sldNum" sz="quarter" idx="5"/>
+          </p:nvPr>
+        </p:nvSpPr>
+        <p:spPr/>
+        <p:txBody>
+          <a:bodyPr/>
+          <a:lstStyle/>
+          <a:p>
+            <a:fld id="{FA398F04-D846-47DF-AB7C-28D61D896A9C}" type="slidenum">
+              <a:rPr lang="en-AU" smtClean="0"/>
+              <a:t>10</a:t>
+            </a:fld>
+            <a:endParaRPr lang="en-AU"/>
+          </a:p>
+        </p:txBody>
+      </p:sp>
+    </p:spTree>
+    <p:extLst>
+      <p:ext uri="{BB962C8B-B14F-4D97-AF65-F5344CB8AC3E}">
+        <p14:creationId xmlns:p14="http://schemas.microsoft.com/office/powerpoint/2010/main" val="3024637890"/>
+      </p:ext>
+    </p:extLst>
+  </p:cSld>
+  <p:clrMapOvr>
+    <a:masterClrMapping/>
+  </p:clrMapOvr>
+</p:notes>
+</file>
+
 <file path=ppt/slideLayouts/slideLayout1.xml><?xml version="1.0" encoding="utf-8"?>
 <p:sldLayout xmlns:a="http://schemas.openxmlformats.org/drawingml/2006/main" xmlns:r="http://schemas.openxmlformats.org/officeDocument/2006/relationships" xmlns:p="http://schemas.openxmlformats.org/presentationml/2006/main" type="title" preserve="1">
   <p:cSld name="Title Slide">
@@ -273,7 +1102,7 @@
           <a:p>
             <a:fld id="{C2478F1D-7C0F-400F-87A3-E84D20C54587}" type="datetimeFigureOut">
               <a:rPr lang="en-AU" smtClean="0"/>
-              <a:t>31/10/2022</a:t>
+              <a:t>1/11/2022</a:t>
             </a:fld>
             <a:endParaRPr lang="en-AU"/>
           </a:p>
@@ -473,7 +1302,7 @@
           <a:p>
             <a:fld id="{C2478F1D-7C0F-400F-87A3-E84D20C54587}" type="datetimeFigureOut">
               <a:rPr lang="en-AU" smtClean="0"/>
-              <a:t>31/10/2022</a:t>
+              <a:t>1/11/2022</a:t>
             </a:fld>
             <a:endParaRPr lang="en-AU"/>
           </a:p>
@@ -683,7 +1512,7 @@
           <a:p>
             <a:fld id="{C2478F1D-7C0F-400F-87A3-E84D20C54587}" type="datetimeFigureOut">
               <a:rPr lang="en-AU" smtClean="0"/>
-              <a:t>31/10/2022</a:t>
+              <a:t>1/11/2022</a:t>
             </a:fld>
             <a:endParaRPr lang="en-AU"/>
           </a:p>
@@ -883,7 +1712,7 @@
           <a:p>
             <a:fld id="{C2478F1D-7C0F-400F-87A3-E84D20C54587}" type="datetimeFigureOut">
               <a:rPr lang="en-AU" smtClean="0"/>
-              <a:t>31/10/2022</a:t>
+              <a:t>1/11/2022</a:t>
             </a:fld>
             <a:endParaRPr lang="en-AU"/>
           </a:p>
@@ -1159,7 +1988,7 @@
           <a:p>
             <a:fld id="{C2478F1D-7C0F-400F-87A3-E84D20C54587}" type="datetimeFigureOut">
               <a:rPr lang="en-AU" smtClean="0"/>
-              <a:t>31/10/2022</a:t>
+              <a:t>1/11/2022</a:t>
             </a:fld>
             <a:endParaRPr lang="en-AU"/>
           </a:p>
@@ -1427,7 +2256,7 @@
           <a:p>
             <a:fld id="{C2478F1D-7C0F-400F-87A3-E84D20C54587}" type="datetimeFigureOut">
               <a:rPr lang="en-AU" smtClean="0"/>
-              <a:t>31/10/2022</a:t>
+              <a:t>1/11/2022</a:t>
             </a:fld>
             <a:endParaRPr lang="en-AU"/>
           </a:p>
@@ -1842,7 +2671,7 @@
           <a:p>
             <a:fld id="{C2478F1D-7C0F-400F-87A3-E84D20C54587}" type="datetimeFigureOut">
               <a:rPr lang="en-AU" smtClean="0"/>
-              <a:t>31/10/2022</a:t>
+              <a:t>1/11/2022</a:t>
             </a:fld>
             <a:endParaRPr lang="en-AU"/>
           </a:p>
@@ -1984,7 +2813,7 @@
           <a:p>
             <a:fld id="{C2478F1D-7C0F-400F-87A3-E84D20C54587}" type="datetimeFigureOut">
               <a:rPr lang="en-AU" smtClean="0"/>
-              <a:t>31/10/2022</a:t>
+              <a:t>1/11/2022</a:t>
             </a:fld>
             <a:endParaRPr lang="en-AU"/>
           </a:p>
@@ -2097,7 +2926,7 @@
           <a:p>
             <a:fld id="{C2478F1D-7C0F-400F-87A3-E84D20C54587}" type="datetimeFigureOut">
               <a:rPr lang="en-AU" smtClean="0"/>
-              <a:t>31/10/2022</a:t>
+              <a:t>1/11/2022</a:t>
             </a:fld>
             <a:endParaRPr lang="en-AU"/>
           </a:p>
@@ -2410,7 +3239,7 @@
           <a:p>
             <a:fld id="{C2478F1D-7C0F-400F-87A3-E84D20C54587}" type="datetimeFigureOut">
               <a:rPr lang="en-AU" smtClean="0"/>
-              <a:t>31/10/2022</a:t>
+              <a:t>1/11/2022</a:t>
             </a:fld>
             <a:endParaRPr lang="en-AU"/>
           </a:p>
@@ -2699,7 +3528,7 @@
           <a:p>
             <a:fld id="{C2478F1D-7C0F-400F-87A3-E84D20C54587}" type="datetimeFigureOut">
               <a:rPr lang="en-AU" smtClean="0"/>
-              <a:t>31/10/2022</a:t>
+              <a:t>1/11/2022</a:t>
             </a:fld>
             <a:endParaRPr lang="en-AU"/>
           </a:p>
@@ -2942,7 +3771,7 @@
           <a:p>
             <a:fld id="{C2478F1D-7C0F-400F-87A3-E84D20C54587}" type="datetimeFigureOut">
               <a:rPr lang="en-AU" smtClean="0"/>
-              <a:t>31/10/2022</a:t>
+              <a:t>1/11/2022</a:t>
             </a:fld>
             <a:endParaRPr lang="en-AU"/>
           </a:p>
@@ -3656,12 +4485,807 @@
           <a:chExt cx="0" cy="0"/>
         </a:xfrm>
       </p:grpSpPr>
-      <p:sp>
-        <p:nvSpPr>
-          <p:cNvPr id="4" name="Title 3">
-            <a:extLst>
-              <a:ext uri="{FF2B5EF4-FFF2-40B4-BE49-F238E27FC236}">
-                <a16:creationId xmlns:a16="http://schemas.microsoft.com/office/drawing/2014/main" id="{9CBAAC23-0889-0EB0-23F1-CB36F6A17C23}"/>
+      <p:pic>
+        <p:nvPicPr>
+          <p:cNvPr id="5" name="Content Placeholder 4" descr="Chart, bar chart&#10;&#10;Description automatically generated">
+            <a:extLst>
+              <a:ext uri="{FF2B5EF4-FFF2-40B4-BE49-F238E27FC236}">
+                <a16:creationId xmlns:a16="http://schemas.microsoft.com/office/drawing/2014/main" id="{145E8985-1C84-64C9-3B29-6FDB01CA8398}"/>
+              </a:ext>
+            </a:extLst>
+          </p:cNvPr>
+          <p:cNvPicPr>
+            <a:picLocks noGrp="1" noChangeAspect="1"/>
+          </p:cNvPicPr>
+          <p:nvPr>
+            <p:ph idx="1"/>
+          </p:nvPr>
+        </p:nvPicPr>
+        <p:blipFill>
+          <a:blip r:embed="rId3">
+            <a:extLst>
+              <a:ext uri="{28A0092B-C50C-407E-A947-70E740481C1C}">
+                <a14:useLocalDpi xmlns:a14="http://schemas.microsoft.com/office/drawing/2010/main" val="0"/>
+              </a:ext>
+            </a:extLst>
+          </a:blip>
+          <a:stretch>
+            <a:fillRect/>
+          </a:stretch>
+        </p:blipFill>
+        <p:spPr>
+          <a:xfrm>
+            <a:off x="259533" y="1932317"/>
+            <a:ext cx="11672934" cy="3256210"/>
+          </a:xfrm>
+        </p:spPr>
+      </p:pic>
+      <p:sp>
+        <p:nvSpPr>
+          <p:cNvPr id="6" name="Rectangle 5">
+            <a:extLst>
+              <a:ext uri="{FF2B5EF4-FFF2-40B4-BE49-F238E27FC236}">
+                <a16:creationId xmlns:a16="http://schemas.microsoft.com/office/drawing/2014/main" id="{80E37D0A-6AAE-77CF-2668-C5B4CEEEDBAB}"/>
+              </a:ext>
+            </a:extLst>
+          </p:cNvPr>
+          <p:cNvSpPr/>
+          <p:nvPr/>
+        </p:nvSpPr>
+        <p:spPr>
+          <a:xfrm>
+            <a:off x="1061049" y="3994030"/>
+            <a:ext cx="655608" cy="1311215"/>
+          </a:xfrm>
+          <a:prstGeom prst="rect">
+            <a:avLst/>
+          </a:prstGeom>
+          <a:noFill/>
+          <a:ln w="19050">
+            <a:solidFill>
+              <a:srgbClr val="FF0000"/>
+            </a:solidFill>
+            <a:prstDash val="sysDash"/>
+          </a:ln>
+        </p:spPr>
+        <p:style>
+          <a:lnRef idx="2">
+            <a:schemeClr val="accent1">
+              <a:shade val="50000"/>
+            </a:schemeClr>
+          </a:lnRef>
+          <a:fillRef idx="1">
+            <a:schemeClr val="accent1"/>
+          </a:fillRef>
+          <a:effectRef idx="0">
+            <a:schemeClr val="accent1"/>
+          </a:effectRef>
+          <a:fontRef idx="minor">
+            <a:schemeClr val="lt1"/>
+          </a:fontRef>
+        </p:style>
+        <p:txBody>
+          <a:bodyPr rtlCol="0" anchor="ctr"/>
+          <a:lstStyle/>
+          <a:p>
+            <a:pPr algn="ctr"/>
+            <a:endParaRPr lang="en-AU"/>
+          </a:p>
+        </p:txBody>
+      </p:sp>
+      <p:sp>
+        <p:nvSpPr>
+          <p:cNvPr id="7" name="Rectangle 6">
+            <a:extLst>
+              <a:ext uri="{FF2B5EF4-FFF2-40B4-BE49-F238E27FC236}">
+                <a16:creationId xmlns:a16="http://schemas.microsoft.com/office/drawing/2014/main" id="{A6BF3056-5979-C00F-FD14-036C4D47811D}"/>
+              </a:ext>
+            </a:extLst>
+          </p:cNvPr>
+          <p:cNvSpPr/>
+          <p:nvPr/>
+        </p:nvSpPr>
+        <p:spPr>
+          <a:xfrm>
+            <a:off x="7769525" y="4118942"/>
+            <a:ext cx="655608" cy="1186304"/>
+          </a:xfrm>
+          <a:prstGeom prst="rect">
+            <a:avLst/>
+          </a:prstGeom>
+          <a:noFill/>
+          <a:ln w="19050">
+            <a:solidFill>
+              <a:srgbClr val="FF0000"/>
+            </a:solidFill>
+            <a:prstDash val="sysDash"/>
+          </a:ln>
+        </p:spPr>
+        <p:style>
+          <a:lnRef idx="2">
+            <a:schemeClr val="accent1">
+              <a:shade val="50000"/>
+            </a:schemeClr>
+          </a:lnRef>
+          <a:fillRef idx="1">
+            <a:schemeClr val="accent1"/>
+          </a:fillRef>
+          <a:effectRef idx="0">
+            <a:schemeClr val="accent1"/>
+          </a:effectRef>
+          <a:fontRef idx="minor">
+            <a:schemeClr val="lt1"/>
+          </a:fontRef>
+        </p:style>
+        <p:txBody>
+          <a:bodyPr rtlCol="0" anchor="ctr"/>
+          <a:lstStyle/>
+          <a:p>
+            <a:pPr algn="ctr"/>
+            <a:endParaRPr lang="en-AU"/>
+          </a:p>
+        </p:txBody>
+      </p:sp>
+      <p:sp>
+        <p:nvSpPr>
+          <p:cNvPr id="8" name="Rectangle 7">
+            <a:extLst>
+              <a:ext uri="{FF2B5EF4-FFF2-40B4-BE49-F238E27FC236}">
+                <a16:creationId xmlns:a16="http://schemas.microsoft.com/office/drawing/2014/main" id="{2E5953DD-115C-E20F-29FD-0243D661EC87}"/>
+              </a:ext>
+            </a:extLst>
+          </p:cNvPr>
+          <p:cNvSpPr/>
+          <p:nvPr/>
+        </p:nvSpPr>
+        <p:spPr>
+          <a:xfrm>
+            <a:off x="707366" y="3429000"/>
+            <a:ext cx="353684" cy="388189"/>
+          </a:xfrm>
+          <a:prstGeom prst="rect">
+            <a:avLst/>
+          </a:prstGeom>
+          <a:noFill/>
+          <a:ln w="28575">
+            <a:solidFill>
+              <a:srgbClr val="002060"/>
+            </a:solidFill>
+            <a:prstDash val="sysDot"/>
+          </a:ln>
+        </p:spPr>
+        <p:style>
+          <a:lnRef idx="2">
+            <a:schemeClr val="accent1">
+              <a:shade val="50000"/>
+            </a:schemeClr>
+          </a:lnRef>
+          <a:fillRef idx="1">
+            <a:schemeClr val="accent1"/>
+          </a:fillRef>
+          <a:effectRef idx="0">
+            <a:schemeClr val="accent1"/>
+          </a:effectRef>
+          <a:fontRef idx="minor">
+            <a:schemeClr val="lt1"/>
+          </a:fontRef>
+        </p:style>
+        <p:txBody>
+          <a:bodyPr rtlCol="0" anchor="ctr"/>
+          <a:lstStyle/>
+          <a:p>
+            <a:pPr algn="ctr"/>
+            <a:endParaRPr lang="en-AU"/>
+          </a:p>
+        </p:txBody>
+      </p:sp>
+      <p:sp>
+        <p:nvSpPr>
+          <p:cNvPr id="9" name="Rectangle 8">
+            <a:extLst>
+              <a:ext uri="{FF2B5EF4-FFF2-40B4-BE49-F238E27FC236}">
+                <a16:creationId xmlns:a16="http://schemas.microsoft.com/office/drawing/2014/main" id="{96FF3FE0-5B92-6576-78FA-1E81B0CA0751}"/>
+              </a:ext>
+            </a:extLst>
+          </p:cNvPr>
+          <p:cNvSpPr/>
+          <p:nvPr/>
+        </p:nvSpPr>
+        <p:spPr>
+          <a:xfrm>
+            <a:off x="3404558" y="2304691"/>
+            <a:ext cx="353684" cy="388189"/>
+          </a:xfrm>
+          <a:prstGeom prst="rect">
+            <a:avLst/>
+          </a:prstGeom>
+          <a:noFill/>
+          <a:ln w="28575">
+            <a:solidFill>
+              <a:srgbClr val="002060"/>
+            </a:solidFill>
+            <a:prstDash val="sysDot"/>
+          </a:ln>
+        </p:spPr>
+        <p:style>
+          <a:lnRef idx="2">
+            <a:schemeClr val="accent1">
+              <a:shade val="50000"/>
+            </a:schemeClr>
+          </a:lnRef>
+          <a:fillRef idx="1">
+            <a:schemeClr val="accent1"/>
+          </a:fillRef>
+          <a:effectRef idx="0">
+            <a:schemeClr val="accent1"/>
+          </a:effectRef>
+          <a:fontRef idx="minor">
+            <a:schemeClr val="lt1"/>
+          </a:fontRef>
+        </p:style>
+        <p:txBody>
+          <a:bodyPr rtlCol="0" anchor="ctr"/>
+          <a:lstStyle/>
+          <a:p>
+            <a:pPr algn="ctr"/>
+            <a:endParaRPr lang="en-AU"/>
+          </a:p>
+        </p:txBody>
+      </p:sp>
+      <p:sp>
+        <p:nvSpPr>
+          <p:cNvPr id="10" name="Rectangle 9">
+            <a:extLst>
+              <a:ext uri="{FF2B5EF4-FFF2-40B4-BE49-F238E27FC236}">
+                <a16:creationId xmlns:a16="http://schemas.microsoft.com/office/drawing/2014/main" id="{BB2B8582-6183-42E9-A0B3-4AAFC00F9F51}"/>
+              </a:ext>
+            </a:extLst>
+          </p:cNvPr>
+          <p:cNvSpPr/>
+          <p:nvPr/>
+        </p:nvSpPr>
+        <p:spPr>
+          <a:xfrm>
+            <a:off x="10107283" y="3924846"/>
+            <a:ext cx="353684" cy="388189"/>
+          </a:xfrm>
+          <a:prstGeom prst="rect">
+            <a:avLst/>
+          </a:prstGeom>
+          <a:noFill/>
+          <a:ln w="28575">
+            <a:solidFill>
+              <a:srgbClr val="002060"/>
+            </a:solidFill>
+            <a:prstDash val="sysDot"/>
+          </a:ln>
+        </p:spPr>
+        <p:style>
+          <a:lnRef idx="2">
+            <a:schemeClr val="accent1">
+              <a:shade val="50000"/>
+            </a:schemeClr>
+          </a:lnRef>
+          <a:fillRef idx="1">
+            <a:schemeClr val="accent1"/>
+          </a:fillRef>
+          <a:effectRef idx="0">
+            <a:schemeClr val="accent1"/>
+          </a:effectRef>
+          <a:fontRef idx="minor">
+            <a:schemeClr val="lt1"/>
+          </a:fontRef>
+        </p:style>
+        <p:txBody>
+          <a:bodyPr rtlCol="0" anchor="ctr"/>
+          <a:lstStyle/>
+          <a:p>
+            <a:pPr algn="ctr"/>
+            <a:endParaRPr lang="en-AU"/>
+          </a:p>
+        </p:txBody>
+      </p:sp>
+      <p:sp>
+        <p:nvSpPr>
+          <p:cNvPr id="12" name="Rectangle 11">
+            <a:extLst>
+              <a:ext uri="{FF2B5EF4-FFF2-40B4-BE49-F238E27FC236}">
+                <a16:creationId xmlns:a16="http://schemas.microsoft.com/office/drawing/2014/main" id="{1EA06623-AD0D-223A-9FDB-08ED5D9F3931}"/>
+              </a:ext>
+            </a:extLst>
+          </p:cNvPr>
+          <p:cNvSpPr/>
+          <p:nvPr/>
+        </p:nvSpPr>
+        <p:spPr>
+          <a:xfrm>
+            <a:off x="7415841" y="4261448"/>
+            <a:ext cx="353684" cy="388189"/>
+          </a:xfrm>
+          <a:prstGeom prst="rect">
+            <a:avLst/>
+          </a:prstGeom>
+          <a:noFill/>
+          <a:ln w="28575">
+            <a:solidFill>
+              <a:srgbClr val="002060"/>
+            </a:solidFill>
+            <a:prstDash val="sysDot"/>
+          </a:ln>
+        </p:spPr>
+        <p:style>
+          <a:lnRef idx="2">
+            <a:schemeClr val="accent1">
+              <a:shade val="50000"/>
+            </a:schemeClr>
+          </a:lnRef>
+          <a:fillRef idx="1">
+            <a:schemeClr val="accent1"/>
+          </a:fillRef>
+          <a:effectRef idx="0">
+            <a:schemeClr val="accent1"/>
+          </a:effectRef>
+          <a:fontRef idx="minor">
+            <a:schemeClr val="lt1"/>
+          </a:fontRef>
+        </p:style>
+        <p:txBody>
+          <a:bodyPr rtlCol="0" anchor="ctr"/>
+          <a:lstStyle/>
+          <a:p>
+            <a:pPr algn="ctr"/>
+            <a:endParaRPr lang="en-AU"/>
+          </a:p>
+        </p:txBody>
+      </p:sp>
+      <p:sp>
+        <p:nvSpPr>
+          <p:cNvPr id="13" name="Rectangle 12">
+            <a:extLst>
+              <a:ext uri="{FF2B5EF4-FFF2-40B4-BE49-F238E27FC236}">
+                <a16:creationId xmlns:a16="http://schemas.microsoft.com/office/drawing/2014/main" id="{C4BA45EA-6910-4C92-DBC3-788E66597FC7}"/>
+              </a:ext>
+            </a:extLst>
+          </p:cNvPr>
+          <p:cNvSpPr/>
+          <p:nvPr/>
+        </p:nvSpPr>
+        <p:spPr>
+          <a:xfrm>
+            <a:off x="9451675" y="3935588"/>
+            <a:ext cx="353684" cy="388189"/>
+          </a:xfrm>
+          <a:prstGeom prst="rect">
+            <a:avLst/>
+          </a:prstGeom>
+          <a:noFill/>
+          <a:ln w="28575">
+            <a:solidFill>
+              <a:srgbClr val="002060"/>
+            </a:solidFill>
+            <a:prstDash val="sysDot"/>
+          </a:ln>
+        </p:spPr>
+        <p:style>
+          <a:lnRef idx="2">
+            <a:schemeClr val="accent1">
+              <a:shade val="50000"/>
+            </a:schemeClr>
+          </a:lnRef>
+          <a:fillRef idx="1">
+            <a:schemeClr val="accent1"/>
+          </a:fillRef>
+          <a:effectRef idx="0">
+            <a:schemeClr val="accent1"/>
+          </a:effectRef>
+          <a:fontRef idx="minor">
+            <a:schemeClr val="lt1"/>
+          </a:fontRef>
+        </p:style>
+        <p:txBody>
+          <a:bodyPr rtlCol="0" anchor="ctr"/>
+          <a:lstStyle/>
+          <a:p>
+            <a:pPr algn="ctr"/>
+            <a:endParaRPr lang="en-AU"/>
+          </a:p>
+        </p:txBody>
+      </p:sp>
+      <p:sp>
+        <p:nvSpPr>
+          <p:cNvPr id="11" name="Speech Bubble: Rectangle 10">
+            <a:extLst>
+              <a:ext uri="{FF2B5EF4-FFF2-40B4-BE49-F238E27FC236}">
+                <a16:creationId xmlns:a16="http://schemas.microsoft.com/office/drawing/2014/main" id="{388FF869-4FBD-EEE1-FC26-F05FA2001AD2}"/>
+              </a:ext>
+            </a:extLst>
+          </p:cNvPr>
+          <p:cNvSpPr/>
+          <p:nvPr/>
+        </p:nvSpPr>
+        <p:spPr>
+          <a:xfrm>
+            <a:off x="908937" y="5694559"/>
+            <a:ext cx="2113280" cy="655442"/>
+          </a:xfrm>
+          <a:prstGeom prst="wedgeRectCallout">
+            <a:avLst>
+              <a:gd name="adj1" fmla="val -38621"/>
+              <a:gd name="adj2" fmla="val -97575"/>
+            </a:avLst>
+          </a:prstGeom>
+          <a:noFill/>
+        </p:spPr>
+        <p:style>
+          <a:lnRef idx="2">
+            <a:schemeClr val="accent1">
+              <a:shade val="50000"/>
+            </a:schemeClr>
+          </a:lnRef>
+          <a:fillRef idx="1">
+            <a:schemeClr val="accent1"/>
+          </a:fillRef>
+          <a:effectRef idx="0">
+            <a:schemeClr val="accent1"/>
+          </a:effectRef>
+          <a:fontRef idx="minor">
+            <a:schemeClr val="lt1"/>
+          </a:fontRef>
+        </p:style>
+        <p:txBody>
+          <a:bodyPr rtlCol="0" anchor="ctr"/>
+          <a:lstStyle/>
+          <a:p>
+            <a:pPr algn="ctr"/>
+            <a:r>
+              <a:rPr lang="en-AU" sz="1400" dirty="0">
+                <a:solidFill>
+                  <a:schemeClr val="tx1"/>
+                </a:solidFill>
+                <a:latin typeface="Arial" panose="020B0604020202020204" pitchFamily="34" charset="0"/>
+                <a:cs typeface="Arial" panose="020B0604020202020204" pitchFamily="34" charset="0"/>
+              </a:rPr>
+              <a:t>Decreasing trend in tobacco spending </a:t>
+            </a:r>
+          </a:p>
+        </p:txBody>
+      </p:sp>
+      <p:sp>
+        <p:nvSpPr>
+          <p:cNvPr id="14" name="Speech Bubble: Rectangle 13">
+            <a:extLst>
+              <a:ext uri="{FF2B5EF4-FFF2-40B4-BE49-F238E27FC236}">
+                <a16:creationId xmlns:a16="http://schemas.microsoft.com/office/drawing/2014/main" id="{32651EE8-1C74-A7DA-FCBC-03A973215238}"/>
+              </a:ext>
+            </a:extLst>
+          </p:cNvPr>
+          <p:cNvSpPr/>
+          <p:nvPr/>
+        </p:nvSpPr>
+        <p:spPr>
+          <a:xfrm>
+            <a:off x="7769525" y="5671606"/>
+            <a:ext cx="2113280" cy="655442"/>
+          </a:xfrm>
+          <a:prstGeom prst="wedgeRectCallout">
+            <a:avLst>
+              <a:gd name="adj1" fmla="val -38621"/>
+              <a:gd name="adj2" fmla="val -97575"/>
+            </a:avLst>
+          </a:prstGeom>
+          <a:noFill/>
+        </p:spPr>
+        <p:style>
+          <a:lnRef idx="2">
+            <a:schemeClr val="accent1">
+              <a:shade val="50000"/>
+            </a:schemeClr>
+          </a:lnRef>
+          <a:fillRef idx="1">
+            <a:schemeClr val="accent1"/>
+          </a:fillRef>
+          <a:effectRef idx="0">
+            <a:schemeClr val="accent1"/>
+          </a:effectRef>
+          <a:fontRef idx="minor">
+            <a:schemeClr val="lt1"/>
+          </a:fontRef>
+        </p:style>
+        <p:txBody>
+          <a:bodyPr rtlCol="0" anchor="ctr"/>
+          <a:lstStyle/>
+          <a:p>
+            <a:pPr algn="ctr"/>
+            <a:r>
+              <a:rPr lang="en-AU" sz="1400" dirty="0">
+                <a:solidFill>
+                  <a:schemeClr val="tx1"/>
+                </a:solidFill>
+                <a:latin typeface="Arial" panose="020B0604020202020204" pitchFamily="34" charset="0"/>
+                <a:cs typeface="Arial" panose="020B0604020202020204" pitchFamily="34" charset="0"/>
+              </a:rPr>
+              <a:t>Increasing spending in communication YoY</a:t>
+            </a:r>
+          </a:p>
+        </p:txBody>
+      </p:sp>
+      <p:sp>
+        <p:nvSpPr>
+          <p:cNvPr id="15" name="Rectangle 14">
+            <a:extLst>
+              <a:ext uri="{FF2B5EF4-FFF2-40B4-BE49-F238E27FC236}">
+                <a16:creationId xmlns:a16="http://schemas.microsoft.com/office/drawing/2014/main" id="{D072C734-DD72-9BF4-F1FB-545DC37C67DD}"/>
+              </a:ext>
+            </a:extLst>
+          </p:cNvPr>
+          <p:cNvSpPr/>
+          <p:nvPr/>
+        </p:nvSpPr>
+        <p:spPr>
+          <a:xfrm>
+            <a:off x="555253" y="795786"/>
+            <a:ext cx="353684" cy="388189"/>
+          </a:xfrm>
+          <a:prstGeom prst="rect">
+            <a:avLst/>
+          </a:prstGeom>
+          <a:noFill/>
+          <a:ln w="28575">
+            <a:solidFill>
+              <a:srgbClr val="002060"/>
+            </a:solidFill>
+            <a:prstDash val="sysDot"/>
+          </a:ln>
+        </p:spPr>
+        <p:style>
+          <a:lnRef idx="2">
+            <a:schemeClr val="accent1">
+              <a:shade val="50000"/>
+            </a:schemeClr>
+          </a:lnRef>
+          <a:fillRef idx="1">
+            <a:schemeClr val="accent1"/>
+          </a:fillRef>
+          <a:effectRef idx="0">
+            <a:schemeClr val="accent1"/>
+          </a:effectRef>
+          <a:fontRef idx="minor">
+            <a:schemeClr val="lt1"/>
+          </a:fontRef>
+        </p:style>
+        <p:txBody>
+          <a:bodyPr rtlCol="0" anchor="ctr"/>
+          <a:lstStyle/>
+          <a:p>
+            <a:pPr algn="ctr"/>
+            <a:endParaRPr lang="en-AU"/>
+          </a:p>
+        </p:txBody>
+      </p:sp>
+      <p:sp>
+        <p:nvSpPr>
+          <p:cNvPr id="16" name="TextBox 15">
+            <a:extLst>
+              <a:ext uri="{FF2B5EF4-FFF2-40B4-BE49-F238E27FC236}">
+                <a16:creationId xmlns:a16="http://schemas.microsoft.com/office/drawing/2014/main" id="{809C6389-EBF4-FB2D-BB70-E703CEE43E87}"/>
+              </a:ext>
+            </a:extLst>
+          </p:cNvPr>
+          <p:cNvSpPr txBox="1"/>
+          <p:nvPr/>
+        </p:nvSpPr>
+        <p:spPr>
+          <a:xfrm>
+            <a:off x="908937" y="663072"/>
+            <a:ext cx="7348747" cy="954107"/>
+          </a:xfrm>
+          <a:prstGeom prst="rect">
+            <a:avLst/>
+          </a:prstGeom>
+          <a:noFill/>
+        </p:spPr>
+        <p:txBody>
+          <a:bodyPr wrap="square" rtlCol="0">
+            <a:spAutoFit/>
+          </a:bodyPr>
+          <a:lstStyle/>
+          <a:p>
+            <a:r>
+              <a:rPr lang="en-AU" sz="1400" dirty="0">
+                <a:latin typeface="Arial" panose="020B0604020202020204" pitchFamily="34" charset="0"/>
+                <a:cs typeface="Arial" panose="020B0604020202020204" pitchFamily="34" charset="0"/>
+              </a:rPr>
+              <a:t>These observed changes in  2020/2021 are likely to be driven by covid pandemic.</a:t>
+            </a:r>
+          </a:p>
+          <a:p>
+            <a:pPr marL="285750" indent="-285750">
+              <a:buFont typeface="Arial" panose="020B0604020202020204" pitchFamily="34" charset="0"/>
+              <a:buChar char="•"/>
+            </a:pPr>
+            <a:r>
+              <a:rPr lang="en-AU" sz="1400" dirty="0">
+                <a:latin typeface="Arial" panose="020B0604020202020204" pitchFamily="34" charset="0"/>
+                <a:cs typeface="Arial" panose="020B0604020202020204" pitchFamily="34" charset="0"/>
+              </a:rPr>
+              <a:t>Material increase in spending on food and rent</a:t>
+            </a:r>
+          </a:p>
+          <a:p>
+            <a:pPr marL="285750" indent="-285750">
+              <a:buFont typeface="Arial" panose="020B0604020202020204" pitchFamily="34" charset="0"/>
+              <a:buChar char="•"/>
+            </a:pPr>
+            <a:r>
+              <a:rPr lang="en-AU" sz="1400" dirty="0">
+                <a:latin typeface="Arial" panose="020B0604020202020204" pitchFamily="34" charset="0"/>
+                <a:cs typeface="Arial" panose="020B0604020202020204" pitchFamily="34" charset="0"/>
+              </a:rPr>
+              <a:t>Small increase in spending on education</a:t>
+            </a:r>
+          </a:p>
+          <a:p>
+            <a:pPr marL="285750" indent="-285750">
+              <a:buFont typeface="Arial" panose="020B0604020202020204" pitchFamily="34" charset="0"/>
+              <a:buChar char="•"/>
+            </a:pPr>
+            <a:r>
+              <a:rPr lang="en-AU" sz="1400" dirty="0">
+                <a:latin typeface="Arial" panose="020B0604020202020204" pitchFamily="34" charset="0"/>
+                <a:cs typeface="Arial" panose="020B0604020202020204" pitchFamily="34" charset="0"/>
+              </a:rPr>
+              <a:t>Significant drop in spending in transport, hotel and eating out.</a:t>
+            </a:r>
+          </a:p>
+        </p:txBody>
+      </p:sp>
+      <p:sp>
+        <p:nvSpPr>
+          <p:cNvPr id="17" name="Flowchart: Connector 16">
+            <a:extLst>
+              <a:ext uri="{FF2B5EF4-FFF2-40B4-BE49-F238E27FC236}">
+                <a16:creationId xmlns:a16="http://schemas.microsoft.com/office/drawing/2014/main" id="{6FAA33C2-18B9-E67B-229F-AEAD0766C959}"/>
+              </a:ext>
+            </a:extLst>
+          </p:cNvPr>
+          <p:cNvSpPr/>
+          <p:nvPr/>
+        </p:nvSpPr>
+        <p:spPr>
+          <a:xfrm>
+            <a:off x="8826165" y="3429000"/>
+            <a:ext cx="353684" cy="388189"/>
+          </a:xfrm>
+          <a:prstGeom prst="flowChartConnector">
+            <a:avLst/>
+          </a:prstGeom>
+          <a:noFill/>
+          <a:ln w="19050">
+            <a:solidFill>
+              <a:srgbClr val="00B050"/>
+            </a:solidFill>
+          </a:ln>
+        </p:spPr>
+        <p:style>
+          <a:lnRef idx="2">
+            <a:schemeClr val="accent1">
+              <a:shade val="50000"/>
+            </a:schemeClr>
+          </a:lnRef>
+          <a:fillRef idx="1">
+            <a:schemeClr val="accent1"/>
+          </a:fillRef>
+          <a:effectRef idx="0">
+            <a:schemeClr val="accent1"/>
+          </a:effectRef>
+          <a:fontRef idx="minor">
+            <a:schemeClr val="lt1"/>
+          </a:fontRef>
+        </p:style>
+        <p:txBody>
+          <a:bodyPr rtlCol="0" anchor="ctr"/>
+          <a:lstStyle/>
+          <a:p>
+            <a:pPr algn="ctr"/>
+            <a:endParaRPr lang="en-AU"/>
+          </a:p>
+        </p:txBody>
+      </p:sp>
+      <p:sp>
+        <p:nvSpPr>
+          <p:cNvPr id="18" name="Speech Bubble: Rectangle 17">
+            <a:extLst>
+              <a:ext uri="{FF2B5EF4-FFF2-40B4-BE49-F238E27FC236}">
+                <a16:creationId xmlns:a16="http://schemas.microsoft.com/office/drawing/2014/main" id="{FF4F8820-7736-DAB7-71CC-7821E29A4546}"/>
+              </a:ext>
+            </a:extLst>
+          </p:cNvPr>
+          <p:cNvSpPr/>
+          <p:nvPr/>
+        </p:nvSpPr>
+        <p:spPr>
+          <a:xfrm>
+            <a:off x="9303685" y="2032000"/>
+            <a:ext cx="2113280" cy="1027458"/>
+          </a:xfrm>
+          <a:prstGeom prst="wedgeRectCallout">
+            <a:avLst>
+              <a:gd name="adj1" fmla="val -57371"/>
+              <a:gd name="adj2" fmla="val 78763"/>
+            </a:avLst>
+          </a:prstGeom>
+          <a:noFill/>
+        </p:spPr>
+        <p:style>
+          <a:lnRef idx="2">
+            <a:schemeClr val="accent1">
+              <a:shade val="50000"/>
+            </a:schemeClr>
+          </a:lnRef>
+          <a:fillRef idx="1">
+            <a:schemeClr val="accent1"/>
+          </a:fillRef>
+          <a:effectRef idx="0">
+            <a:schemeClr val="accent1"/>
+          </a:effectRef>
+          <a:fontRef idx="minor">
+            <a:schemeClr val="lt1"/>
+          </a:fontRef>
+        </p:style>
+        <p:txBody>
+          <a:bodyPr rtlCol="0" anchor="ctr"/>
+          <a:lstStyle/>
+          <a:p>
+            <a:pPr algn="ctr"/>
+            <a:r>
+              <a:rPr lang="en-AU" sz="1400" dirty="0">
+                <a:solidFill>
+                  <a:schemeClr val="tx1"/>
+                </a:solidFill>
+                <a:latin typeface="Arial" panose="020B0604020202020204" pitchFamily="34" charset="0"/>
+                <a:cs typeface="Arial" panose="020B0604020202020204" pitchFamily="34" charset="0"/>
+              </a:rPr>
+              <a:t>Massive increase in recreation spending as we emerge out from the pandemic</a:t>
+            </a:r>
+          </a:p>
+        </p:txBody>
+      </p:sp>
+    </p:spTree>
+    <p:extLst>
+      <p:ext uri="{BB962C8B-B14F-4D97-AF65-F5344CB8AC3E}">
+        <p14:creationId xmlns:p14="http://schemas.microsoft.com/office/powerpoint/2010/main" val="4126747790"/>
+      </p:ext>
+    </p:extLst>
+  </p:cSld>
+  <p:clrMapOvr>
+    <a:masterClrMapping/>
+  </p:clrMapOvr>
+</p:sld>
+</file>
+
+<file path=ppt/slides/slide11.xml><?xml version="1.0" encoding="utf-8"?>
+<p:sld xmlns:a="http://schemas.openxmlformats.org/drawingml/2006/main" xmlns:r="http://schemas.openxmlformats.org/officeDocument/2006/relationships" xmlns:p="http://schemas.openxmlformats.org/presentationml/2006/main">
+  <p:cSld>
+    <p:spTree>
+      <p:nvGrpSpPr>
+        <p:cNvPr id="1" name=""/>
+        <p:cNvGrpSpPr/>
+        <p:nvPr/>
+      </p:nvGrpSpPr>
+      <p:grpSpPr>
+        <a:xfrm>
+          <a:off x="0" y="0"/>
+          <a:ext cx="0" cy="0"/>
+          <a:chOff x="0" y="0"/>
+          <a:chExt cx="0" cy="0"/>
+        </a:xfrm>
+      </p:grpSpPr>
+      <p:sp>
+        <p:nvSpPr>
+          <p:cNvPr id="7" name="Title 6">
+            <a:extLst>
+              <a:ext uri="{FF2B5EF4-FFF2-40B4-BE49-F238E27FC236}">
+                <a16:creationId xmlns:a16="http://schemas.microsoft.com/office/drawing/2014/main" id="{9E638611-D19B-63DC-0147-418A705E87B4}"/>
               </a:ext>
             </a:extLst>
           </p:cNvPr>
@@ -3674,19 +5298,28 @@
         </p:nvSpPr>
         <p:spPr/>
         <p:txBody>
-          <a:bodyPr/>
-          <a:lstStyle/>
-          <a:p>
-            <a:endParaRPr lang="en-AU"/>
-          </a:p>
-        </p:txBody>
-      </p:sp>
-      <p:sp>
-        <p:nvSpPr>
-          <p:cNvPr id="6" name="Content Placeholder 5">
-            <a:extLst>
-              <a:ext uri="{FF2B5EF4-FFF2-40B4-BE49-F238E27FC236}">
-                <a16:creationId xmlns:a16="http://schemas.microsoft.com/office/drawing/2014/main" id="{2D68DB38-51DF-50E8-61EE-4D553A1E9053}"/>
+          <a:bodyPr>
+            <a:normAutofit/>
+          </a:bodyPr>
+          <a:lstStyle/>
+          <a:p>
+            <a:r>
+              <a:rPr lang="en-AU" sz="2800" b="1" dirty="0">
+                <a:latin typeface="Arial" panose="020B0604020202020204" pitchFamily="34" charset="0"/>
+                <a:cs typeface="Arial" panose="020B0604020202020204" pitchFamily="34" charset="0"/>
+              </a:rPr>
+              <a:t>Relationship between unemployment and household consumption</a:t>
+            </a:r>
+            <a:endParaRPr lang="en-AU" sz="2800" dirty="0"/>
+          </a:p>
+        </p:txBody>
+      </p:sp>
+      <p:sp>
+        <p:nvSpPr>
+          <p:cNvPr id="9" name="Content Placeholder 8">
+            <a:extLst>
+              <a:ext uri="{FF2B5EF4-FFF2-40B4-BE49-F238E27FC236}">
+                <a16:creationId xmlns:a16="http://schemas.microsoft.com/office/drawing/2014/main" id="{5E9F799D-EE2C-4CCD-16EC-E70569837FC1}"/>
               </a:ext>
             </a:extLst>
           </p:cNvPr>
@@ -3699,7 +5332,9 @@
         </p:nvSpPr>
         <p:spPr/>
         <p:txBody>
-          <a:bodyPr/>
+          <a:bodyPr>
+            <a:normAutofit/>
+          </a:bodyPr>
           <a:lstStyle/>
           <a:p>
             <a:pPr marL="0" indent="0">
@@ -3708,6 +5343,210 @@
             <a:r>
               <a:rPr lang="en-AU" sz="2000" b="1" dirty="0"/>
               <a:t>Hypothesis:</a:t>
+            </a:r>
+          </a:p>
+          <a:p>
+            <a:pPr marL="0" indent="0">
+              <a:buNone/>
+            </a:pPr>
+            <a:r>
+              <a:rPr lang="en-AU" sz="2000" dirty="0"/>
+              <a:t>As unemployment increases, </a:t>
+            </a:r>
+          </a:p>
+          <a:p>
+            <a:r>
+              <a:rPr lang="en-AU" sz="2000" dirty="0"/>
+              <a:t>Discretionary spending will decrease</a:t>
+            </a:r>
+          </a:p>
+          <a:p>
+            <a:r>
+              <a:rPr lang="en-AU" sz="2000" dirty="0"/>
+              <a:t>Spending on basic needs are likely to have no change</a:t>
+            </a:r>
+          </a:p>
+          <a:p>
+            <a:pPr marL="0" indent="0">
+              <a:buNone/>
+            </a:pPr>
+            <a:r>
+              <a:rPr lang="en-AU" sz="2000" b="1" dirty="0"/>
+              <a:t>Findings:</a:t>
+            </a:r>
+          </a:p>
+          <a:p>
+            <a:pPr marL="0" indent="0">
+              <a:buNone/>
+            </a:pPr>
+            <a:r>
+              <a:rPr lang="en-AU" sz="2000" dirty="0"/>
+              <a:t>The results largely agree with the hypothesis. We also found that spending on tobacco and alcohol are slightly positively correlated with unemployment.</a:t>
+            </a:r>
+          </a:p>
+        </p:txBody>
+      </p:sp>
+      <p:pic>
+        <p:nvPicPr>
+          <p:cNvPr id="15" name="Content Placeholder 14">
+            <a:extLst>
+              <a:ext uri="{FF2B5EF4-FFF2-40B4-BE49-F238E27FC236}">
+                <a16:creationId xmlns:a16="http://schemas.microsoft.com/office/drawing/2014/main" id="{0BC59CEE-94BD-B9CC-F2ED-B301DBC61557}"/>
+              </a:ext>
+            </a:extLst>
+          </p:cNvPr>
+          <p:cNvPicPr>
+            <a:picLocks noGrp="1" noChangeAspect="1"/>
+          </p:cNvPicPr>
+          <p:nvPr>
+            <p:ph sz="half" idx="1"/>
+          </p:nvPr>
+        </p:nvPicPr>
+        <p:blipFill>
+          <a:blip r:embed="rId2"/>
+          <a:stretch>
+            <a:fillRect/>
+          </a:stretch>
+        </p:blipFill>
+        <p:spPr>
+          <a:xfrm>
+            <a:off x="431777" y="1926540"/>
+            <a:ext cx="5310838" cy="4250423"/>
+          </a:xfrm>
+        </p:spPr>
+      </p:pic>
+    </p:spTree>
+    <p:extLst>
+      <p:ext uri="{BB962C8B-B14F-4D97-AF65-F5344CB8AC3E}">
+        <p14:creationId xmlns:p14="http://schemas.microsoft.com/office/powerpoint/2010/main" val="1100476953"/>
+      </p:ext>
+    </p:extLst>
+  </p:cSld>
+  <p:clrMapOvr>
+    <a:masterClrMapping/>
+  </p:clrMapOvr>
+</p:sld>
+</file>
+
+<file path=ppt/slides/slide12.xml><?xml version="1.0" encoding="utf-8"?>
+<p:sld xmlns:a="http://schemas.openxmlformats.org/drawingml/2006/main" xmlns:r="http://schemas.openxmlformats.org/officeDocument/2006/relationships" xmlns:p="http://schemas.openxmlformats.org/presentationml/2006/main">
+  <p:cSld>
+    <p:spTree>
+      <p:nvGrpSpPr>
+        <p:cNvPr id="1" name=""/>
+        <p:cNvGrpSpPr/>
+        <p:nvPr/>
+      </p:nvGrpSpPr>
+      <p:grpSpPr>
+        <a:xfrm>
+          <a:off x="0" y="0"/>
+          <a:ext cx="0" cy="0"/>
+          <a:chOff x="0" y="0"/>
+          <a:chExt cx="0" cy="0"/>
+        </a:xfrm>
+      </p:grpSpPr>
+      <p:sp>
+        <p:nvSpPr>
+          <p:cNvPr id="4" name="Title 3">
+            <a:extLst>
+              <a:ext uri="{FF2B5EF4-FFF2-40B4-BE49-F238E27FC236}">
+                <a16:creationId xmlns:a16="http://schemas.microsoft.com/office/drawing/2014/main" id="{9CBAAC23-0889-0EB0-23F1-CB36F6A17C23}"/>
+              </a:ext>
+            </a:extLst>
+          </p:cNvPr>
+          <p:cNvSpPr>
+            <a:spLocks noGrp="1"/>
+          </p:cNvSpPr>
+          <p:nvPr>
+            <p:ph type="title"/>
+          </p:nvPr>
+        </p:nvSpPr>
+        <p:spPr/>
+        <p:txBody>
+          <a:bodyPr>
+            <a:normAutofit/>
+          </a:bodyPr>
+          <a:lstStyle/>
+          <a:p>
+            <a:r>
+              <a:rPr lang="en-AU" sz="3200" b="1" dirty="0">
+                <a:latin typeface="Arial" panose="020B0604020202020204" pitchFamily="34" charset="0"/>
+                <a:cs typeface="Arial" panose="020B0604020202020204" pitchFamily="34" charset="0"/>
+              </a:rPr>
+              <a:t>Relationship between unemployment and household consumption</a:t>
+            </a:r>
+            <a:endParaRPr lang="en-AU" sz="3200" dirty="0"/>
+          </a:p>
+        </p:txBody>
+      </p:sp>
+      <p:sp>
+        <p:nvSpPr>
+          <p:cNvPr id="6" name="Content Placeholder 5">
+            <a:extLst>
+              <a:ext uri="{FF2B5EF4-FFF2-40B4-BE49-F238E27FC236}">
+                <a16:creationId xmlns:a16="http://schemas.microsoft.com/office/drawing/2014/main" id="{2D68DB38-51DF-50E8-61EE-4D553A1E9053}"/>
+              </a:ext>
+            </a:extLst>
+          </p:cNvPr>
+          <p:cNvSpPr>
+            <a:spLocks noGrp="1"/>
+          </p:cNvSpPr>
+          <p:nvPr>
+            <p:ph sz="half" idx="2"/>
+          </p:nvPr>
+        </p:nvSpPr>
+        <p:spPr/>
+        <p:txBody>
+          <a:bodyPr>
+            <a:normAutofit/>
+          </a:bodyPr>
+          <a:lstStyle/>
+          <a:p>
+            <a:pPr marL="0" indent="0">
+              <a:buNone/>
+            </a:pPr>
+            <a:r>
+              <a:rPr lang="en-AU" sz="2000" b="1" dirty="0"/>
+              <a:t>Hypothesis:</a:t>
+            </a:r>
+          </a:p>
+          <a:p>
+            <a:pPr marL="0" indent="0">
+              <a:buNone/>
+            </a:pPr>
+            <a:r>
+              <a:rPr lang="en-AU" sz="2000" dirty="0"/>
+              <a:t>As saving increases, it is expected there is less to be spent </a:t>
+            </a:r>
+          </a:p>
+          <a:p>
+            <a:r>
+              <a:rPr lang="en-AU" sz="2000" dirty="0"/>
+              <a:t>Discretionary spending will decrease</a:t>
+            </a:r>
+          </a:p>
+          <a:p>
+            <a:r>
+              <a:rPr lang="en-AU" sz="2000" dirty="0"/>
+              <a:t>Spending on basic needs are likely to have no change</a:t>
+            </a:r>
+          </a:p>
+          <a:p>
+            <a:pPr marL="0" indent="0">
+              <a:buNone/>
+            </a:pPr>
+            <a:r>
+              <a:rPr lang="en-AU" sz="2000" b="1" dirty="0"/>
+              <a:t>Findings:</a:t>
+            </a:r>
+          </a:p>
+          <a:p>
+            <a:pPr marL="0" indent="0">
+              <a:buNone/>
+            </a:pPr>
+            <a:r>
+              <a:rPr lang="en-AU" sz="2000" dirty="0"/>
+              <a:t>The results largely agree with the hypothesis. We also found that spending on alcohol are positively correlated with saving.</a:t>
             </a:r>
           </a:p>
           <a:p>
@@ -3760,7 +5599,7 @@
 </p:sld>
 </file>
 
-<file path=ppt/slides/slide11.xml><?xml version="1.0" encoding="utf-8"?>
+<file path=ppt/slides/slide13.xml><?xml version="1.0" encoding="utf-8"?>
 <p:sld xmlns:a="http://schemas.openxmlformats.org/drawingml/2006/main" xmlns:r="http://schemas.openxmlformats.org/officeDocument/2006/relationships" xmlns:p="http://schemas.openxmlformats.org/presentationml/2006/main">
   <p:cSld>
     <p:spTree>
@@ -3795,13 +5634,19 @@
         </p:nvSpPr>
         <p:spPr/>
         <p:txBody>
-          <a:bodyPr/>
-          <a:lstStyle/>
-          <a:p>
-            <a:r>
-              <a:rPr lang="en-AU" dirty="0"/>
+          <a:bodyPr>
+            <a:normAutofit/>
+          </a:bodyPr>
+          <a:lstStyle/>
+          <a:p>
+            <a:r>
+              <a:rPr lang="en-AU" sz="2800" b="1" dirty="0">
+                <a:latin typeface="Arial" panose="020B0604020202020204" pitchFamily="34" charset="0"/>
+                <a:cs typeface="Arial" panose="020B0604020202020204" pitchFamily="34" charset="0"/>
+              </a:rPr>
               <a:t>Future Development</a:t>
             </a:r>
+            <a:endParaRPr lang="en-AU" sz="2800" dirty="0"/>
           </a:p>
         </p:txBody>
       </p:sp>
@@ -3823,19 +5668,39 @@
         </p:nvSpPr>
         <p:spPr/>
         <p:txBody>
-          <a:bodyPr/>
-          <a:lstStyle/>
-          <a:p>
-            <a:r>
-              <a:rPr lang="en-AU" dirty="0"/>
-              <a:t>Questions that couldn’t be answer due to time constraints</a:t>
-            </a:r>
-          </a:p>
-          <a:p>
-            <a:r>
-              <a:rPr lang="en-AU" dirty="0"/>
-              <a:t>What would we research next if you have two more weeks</a:t>
-            </a:r>
+          <a:bodyPr>
+            <a:normAutofit/>
+          </a:bodyPr>
+          <a:lstStyle/>
+          <a:p>
+            <a:r>
+              <a:rPr lang="en-AU" sz="2000" dirty="0">
+                <a:latin typeface="Arial" panose="020B0604020202020204" pitchFamily="34" charset="0"/>
+                <a:cs typeface="Arial" panose="020B0604020202020204" pitchFamily="34" charset="0"/>
+              </a:rPr>
+              <a:t>There is an obvious decreasing trend in tobacco spending. What are the likely drivers of this decreasing trend?</a:t>
+            </a:r>
+          </a:p>
+          <a:p>
+            <a:r>
+              <a:rPr lang="en-AU" sz="2000" dirty="0">
+                <a:latin typeface="Arial" panose="020B0604020202020204" pitchFamily="34" charset="0"/>
+                <a:cs typeface="Arial" panose="020B0604020202020204" pitchFamily="34" charset="0"/>
+              </a:rPr>
+              <a:t>For each states and territories, how has the consumption pattern changed over the last ten years?</a:t>
+            </a:r>
+          </a:p>
+          <a:p>
+            <a:endParaRPr lang="en-AU" sz="2000" dirty="0">
+              <a:latin typeface="Arial" panose="020B0604020202020204" pitchFamily="34" charset="0"/>
+              <a:cs typeface="Arial" panose="020B0604020202020204" pitchFamily="34" charset="0"/>
+            </a:endParaRPr>
+          </a:p>
+          <a:p>
+            <a:endParaRPr lang="en-AU" sz="2000" dirty="0">
+              <a:latin typeface="Arial" panose="020B0604020202020204" pitchFamily="34" charset="0"/>
+              <a:cs typeface="Arial" panose="020B0604020202020204" pitchFamily="34" charset="0"/>
+            </a:endParaRPr>
           </a:p>
         </p:txBody>
       </p:sp>
@@ -3852,7 +5717,7 @@
 </p:sld>
 </file>
 
-<file path=ppt/slides/slide12.xml><?xml version="1.0" encoding="utf-8"?>
+<file path=ppt/slides/slide14.xml><?xml version="1.0" encoding="utf-8"?>
 <p:sld xmlns:a="http://schemas.openxmlformats.org/drawingml/2006/main" xmlns:r="http://schemas.openxmlformats.org/officeDocument/2006/relationships" xmlns:p="http://schemas.openxmlformats.org/presentationml/2006/main">
   <p:cSld>
     <p:bg>
@@ -4166,7 +6031,7 @@
 </p:sld>
 </file>
 
-<file path=ppt/slides/slide13.xml><?xml version="1.0" encoding="utf-8"?>
+<file path=ppt/slides/slide15.xml><?xml version="1.0" encoding="utf-8"?>
 <p:sld xmlns:a="http://schemas.openxmlformats.org/drawingml/2006/main" xmlns:r="http://schemas.openxmlformats.org/officeDocument/2006/relationships" xmlns:p="http://schemas.openxmlformats.org/presentationml/2006/main">
   <p:cSld>
     <p:bg>
@@ -4609,18 +6474,13 @@
           <a:lstStyle/>
           <a:p>
             <a:r>
-              <a:rPr lang="en-US">
+              <a:rPr lang="en-US" dirty="0">
                 <a:solidFill>
                   <a:schemeClr val="bg1"/>
                 </a:solidFill>
               </a:rPr>
               <a:t>Project Proposal</a:t>
             </a:r>
-            <a:endParaRPr lang="en-US" dirty="0">
-              <a:solidFill>
-                <a:schemeClr val="bg1"/>
-              </a:solidFill>
-            </a:endParaRPr>
           </a:p>
         </p:txBody>
       </p:sp>
@@ -4653,50 +6513,38 @@
           <a:lstStyle/>
           <a:p>
             <a:r>
-              <a:rPr lang="en-AU" sz="2000">
+              <a:rPr lang="en-AU" sz="2000" dirty="0">
                 <a:latin typeface="Arial" panose="020B0604020202020204" pitchFamily="34" charset="0"/>
                 <a:cs typeface="Arial" panose="020B0604020202020204" pitchFamily="34" charset="0"/>
               </a:rPr>
-              <a:t>Our project seeks to uncover the trend and pattern in Australian household consumption and expenditure.</a:t>
-            </a:r>
-          </a:p>
-          <a:p>
-            <a:r>
-              <a:rPr lang="en-AU" sz="2000">
+              <a:t>We seek to uncover the trend and pattern in Australian household consumption and expenditure.</a:t>
+            </a:r>
+          </a:p>
+          <a:p>
+            <a:r>
+              <a:rPr lang="en-AU" sz="2000" dirty="0">
                 <a:latin typeface="Arial" panose="020B0604020202020204" pitchFamily="34" charset="0"/>
                 <a:cs typeface="Arial" panose="020B0604020202020204" pitchFamily="34" charset="0"/>
               </a:rPr>
-              <a:t>We will examine where do fellow Aussies spend their money. How has the consumption pattern changed over the last ten years?</a:t>
-            </a:r>
-          </a:p>
-          <a:p>
-            <a:r>
-              <a:rPr lang="en-AU" sz="2000">
+              <a:t>We examine where do fellow Aussies spend their money. How has the consumption pattern changed over the last ten years?</a:t>
+            </a:r>
+          </a:p>
+          <a:p>
+            <a:r>
+              <a:rPr lang="en-AU" sz="2000" dirty="0">
                 <a:latin typeface="Arial" panose="020B0604020202020204" pitchFamily="34" charset="0"/>
                 <a:cs typeface="Arial" panose="020B0604020202020204" pitchFamily="34" charset="0"/>
               </a:rPr>
-              <a:t>We will explore if there is any possible Covid pandemic stimulated changes in consumption pattern. What are some of the possible explanations?</a:t>
-            </a:r>
-          </a:p>
-          <a:p>
-            <a:r>
-              <a:rPr lang="en-AU" sz="2000">
+              <a:t>We explore if there is any possible Covid pandemic stimulated changes in consumption pattern. What are some of the possible explanations?</a:t>
+            </a:r>
+          </a:p>
+          <a:p>
+            <a:r>
+              <a:rPr lang="en-AU" sz="2000" dirty="0">
                 <a:latin typeface="Arial" panose="020B0604020202020204" pitchFamily="34" charset="0"/>
                 <a:cs typeface="Arial" panose="020B0604020202020204" pitchFamily="34" charset="0"/>
               </a:rPr>
-              <a:t>We will further examine relationships between Australian household consumption pattern and some key economic indicators?</a:t>
-            </a:r>
-          </a:p>
-          <a:p>
-            <a:r>
-              <a:rPr lang="en-AU" sz="2000">
-                <a:highlight>
-                  <a:srgbClr val="FFFF00"/>
-                </a:highlight>
-                <a:latin typeface="Arial" panose="020B0604020202020204" pitchFamily="34" charset="0"/>
-                <a:cs typeface="Arial" panose="020B0604020202020204" pitchFamily="34" charset="0"/>
-              </a:rPr>
-              <a:t>We will examine relationships between Australian household consumption pattern and movement in BTC price movement.</a:t>
+              <a:t>We further examine the relationships between Australian household consumption pattern and two key economic indicators.</a:t>
             </a:r>
           </a:p>
         </p:txBody>
@@ -4764,7 +6612,7 @@
                 <a:latin typeface="Arial" panose="020B0604020202020204" pitchFamily="34" charset="0"/>
                 <a:cs typeface="Arial" panose="020B0604020202020204" pitchFamily="34" charset="0"/>
               </a:rPr>
-              <a:t>Data Source</a:t>
+              <a:t>Data</a:t>
             </a:r>
           </a:p>
         </p:txBody>
@@ -4840,7 +6688,17 @@
                 <a:latin typeface="Arial" panose="020B0604020202020204" pitchFamily="34" charset="0"/>
                 <a:cs typeface="Arial" panose="020B0604020202020204" pitchFamily="34" charset="0"/>
               </a:rPr>
-              <a:t>, seasonally adjusted data published by the Australian Bureau of Statistics (ABS)</a:t>
+              <a:t>, seasonally adjusted data published by the </a:t>
+            </a:r>
+            <a:r>
+              <a:rPr lang="en-AU" sz="1800" b="1" dirty="0">
+                <a:solidFill>
+                  <a:srgbClr val="FF0000"/>
+                </a:solidFill>
+                <a:latin typeface="Arial" panose="020B0604020202020204" pitchFamily="34" charset="0"/>
+                <a:cs typeface="Arial" panose="020B0604020202020204" pitchFamily="34" charset="0"/>
+              </a:rPr>
+              <a:t>Australian Bureau of Statistics (ABS)</a:t>
             </a:r>
           </a:p>
           <a:p>
@@ -5312,12 +7170,150 @@
             <p:ph idx="1"/>
           </p:nvPr>
         </p:nvSpPr>
-        <p:spPr/>
-        <p:txBody>
-          <a:bodyPr/>
-          <a:lstStyle/>
-          <a:p>
-            <a:endParaRPr lang="en-AU" dirty="0"/>
+        <p:spPr>
+          <a:xfrm>
+            <a:off x="838200" y="1477108"/>
+            <a:ext cx="10515600" cy="4699855"/>
+          </a:xfrm>
+        </p:spPr>
+        <p:txBody>
+          <a:bodyPr>
+            <a:normAutofit fontScale="92500" lnSpcReduction="10000"/>
+          </a:bodyPr>
+          <a:lstStyle/>
+          <a:p>
+            <a:pPr marL="0" indent="0">
+              <a:buNone/>
+            </a:pPr>
+            <a:r>
+              <a:rPr lang="en-AU" sz="2000" b="1" dirty="0">
+                <a:latin typeface="Arial" panose="020B0604020202020204" pitchFamily="34" charset="0"/>
+                <a:cs typeface="Arial" panose="020B0604020202020204" pitchFamily="34" charset="0"/>
+              </a:rPr>
+              <a:t>Download</a:t>
+            </a:r>
+          </a:p>
+          <a:p>
+            <a:r>
+              <a:rPr lang="en-AU" sz="2000" dirty="0">
+                <a:latin typeface="Arial" panose="020B0604020202020204" pitchFamily="34" charset="0"/>
+                <a:cs typeface="Arial" panose="020B0604020202020204" pitchFamily="34" charset="0"/>
+              </a:rPr>
+              <a:t>Data made available by ABS can be downloaded as CSV files. </a:t>
+            </a:r>
+          </a:p>
+          <a:p>
+            <a:r>
+              <a:rPr lang="en-AU" sz="2000" dirty="0">
+                <a:latin typeface="Arial" panose="020B0604020202020204" pitchFamily="34" charset="0"/>
+                <a:cs typeface="Arial" panose="020B0604020202020204" pitchFamily="34" charset="0"/>
+              </a:rPr>
+              <a:t>Generally, the data from ABS is relatively clean (i.e. format is consistent, no missing values or duplication). </a:t>
+            </a:r>
+          </a:p>
+          <a:p>
+            <a:pPr marL="0" indent="0">
+              <a:buNone/>
+            </a:pPr>
+            <a:r>
+              <a:rPr lang="en-AU" sz="2000" b="1" dirty="0">
+                <a:latin typeface="Arial" panose="020B0604020202020204" pitchFamily="34" charset="0"/>
+                <a:cs typeface="Arial" panose="020B0604020202020204" pitchFamily="34" charset="0"/>
+              </a:rPr>
+              <a:t>Identify the relevant time series</a:t>
+            </a:r>
+          </a:p>
+          <a:p>
+            <a:r>
+              <a:rPr lang="en-AU" sz="2000" dirty="0">
+                <a:latin typeface="Arial" panose="020B0604020202020204" pitchFamily="34" charset="0"/>
+                <a:cs typeface="Arial" panose="020B0604020202020204" pitchFamily="34" charset="0"/>
+              </a:rPr>
+              <a:t>Within the same csv, the time series that we are interested in are made available in different type (trend, original and seasonally adjusted). </a:t>
+            </a:r>
+          </a:p>
+          <a:p>
+            <a:pPr marL="0" indent="0">
+              <a:buNone/>
+            </a:pPr>
+            <a:r>
+              <a:rPr lang="en-AU" sz="2000" b="1" dirty="0">
+                <a:latin typeface="Arial" panose="020B0604020202020204" pitchFamily="34" charset="0"/>
+                <a:cs typeface="Arial" panose="020B0604020202020204" pitchFamily="34" charset="0"/>
+              </a:rPr>
+              <a:t>Create new csv files</a:t>
+            </a:r>
+          </a:p>
+          <a:p>
+            <a:r>
+              <a:rPr lang="en-AU" sz="2000" dirty="0">
+                <a:latin typeface="Arial" panose="020B0604020202020204" pitchFamily="34" charset="0"/>
+                <a:cs typeface="Arial" panose="020B0604020202020204" pitchFamily="34" charset="0"/>
+              </a:rPr>
+              <a:t>We manually copy and paste the seasonally adjusted time series and filter for the study period 2012-2022 into a new csv. </a:t>
+            </a:r>
+          </a:p>
+          <a:p>
+            <a:pPr marL="0" indent="0">
+              <a:buNone/>
+            </a:pPr>
+            <a:r>
+              <a:rPr lang="en-AU" sz="2000" b="1" dirty="0">
+                <a:latin typeface="Arial" panose="020B0604020202020204" pitchFamily="34" charset="0"/>
+                <a:cs typeface="Arial" panose="020B0604020202020204" pitchFamily="34" charset="0"/>
+              </a:rPr>
+              <a:t>Additional checking before analysis</a:t>
+            </a:r>
+            <a:endParaRPr lang="en-AU" sz="2000" dirty="0">
+              <a:latin typeface="Arial" panose="020B0604020202020204" pitchFamily="34" charset="0"/>
+              <a:cs typeface="Arial" panose="020B0604020202020204" pitchFamily="34" charset="0"/>
+            </a:endParaRPr>
+          </a:p>
+          <a:p>
+            <a:r>
+              <a:rPr lang="en-AU" sz="2000" dirty="0">
+                <a:latin typeface="Arial" panose="020B0604020202020204" pitchFamily="34" charset="0"/>
+                <a:cs typeface="Arial" panose="020B0604020202020204" pitchFamily="34" charset="0"/>
+              </a:rPr>
+              <a:t>These csv files are then read into a pandas </a:t>
+            </a:r>
+            <a:r>
+              <a:rPr lang="en-AU" sz="2000" dirty="0" err="1">
+                <a:latin typeface="Arial" panose="020B0604020202020204" pitchFamily="34" charset="0"/>
+                <a:cs typeface="Arial" panose="020B0604020202020204" pitchFamily="34" charset="0"/>
+              </a:rPr>
+              <a:t>Dataframe</a:t>
+            </a:r>
+            <a:r>
+              <a:rPr lang="en-AU" sz="2000" dirty="0">
+                <a:latin typeface="Arial" panose="020B0604020202020204" pitchFamily="34" charset="0"/>
+                <a:cs typeface="Arial" panose="020B0604020202020204" pitchFamily="34" charset="0"/>
+              </a:rPr>
+              <a:t> for further analysis.</a:t>
+            </a:r>
+          </a:p>
+          <a:p>
+            <a:r>
+              <a:rPr lang="en-AU" sz="2000" dirty="0">
+                <a:latin typeface="Arial" panose="020B0604020202020204" pitchFamily="34" charset="0"/>
+                <a:cs typeface="Arial" panose="020B0604020202020204" pitchFamily="34" charset="0"/>
+              </a:rPr>
+              <a:t>Once it’s in a </a:t>
+            </a:r>
+            <a:r>
+              <a:rPr lang="en-AU" sz="2000" dirty="0" err="1">
+                <a:latin typeface="Arial" panose="020B0604020202020204" pitchFamily="34" charset="0"/>
+                <a:cs typeface="Arial" panose="020B0604020202020204" pitchFamily="34" charset="0"/>
+              </a:rPr>
+              <a:t>dataframe</a:t>
+            </a:r>
+            <a:r>
+              <a:rPr lang="en-AU" sz="2000" dirty="0">
+                <a:latin typeface="Arial" panose="020B0604020202020204" pitchFamily="34" charset="0"/>
+                <a:cs typeface="Arial" panose="020B0604020202020204" pitchFamily="34" charset="0"/>
+              </a:rPr>
+              <a:t>, we check for missing values and duplication to identify potential copy and paste error in the extraction step.</a:t>
+            </a:r>
           </a:p>
         </p:txBody>
       </p:sp>
@@ -5356,6 +7352,880 @@
           <p:cNvPr id="2" name="Title 1">
             <a:extLst>
               <a:ext uri="{FF2B5EF4-FFF2-40B4-BE49-F238E27FC236}">
+                <a16:creationId xmlns:a16="http://schemas.microsoft.com/office/drawing/2014/main" id="{18CA04D8-9155-9536-DFE1-AD6BD6BD7733}"/>
+              </a:ext>
+            </a:extLst>
+          </p:cNvPr>
+          <p:cNvSpPr>
+            <a:spLocks noGrp="1"/>
+          </p:cNvSpPr>
+          <p:nvPr>
+            <p:ph type="title"/>
+          </p:nvPr>
+        </p:nvSpPr>
+        <p:spPr/>
+        <p:txBody>
+          <a:bodyPr>
+            <a:normAutofit/>
+          </a:bodyPr>
+          <a:lstStyle/>
+          <a:p>
+            <a:r>
+              <a:rPr lang="en-AU" sz="2800" b="1" dirty="0">
+                <a:latin typeface="Arial" panose="020B0604020202020204" pitchFamily="34" charset="0"/>
+                <a:cs typeface="Arial" panose="020B0604020202020204" pitchFamily="34" charset="0"/>
+              </a:rPr>
+              <a:t>Data </a:t>
+            </a:r>
+            <a:r>
+              <a:rPr lang="en-AU" sz="2800" b="1" dirty="0" err="1">
+                <a:latin typeface="Arial" panose="020B0604020202020204" pitchFamily="34" charset="0"/>
+                <a:cs typeface="Arial" panose="020B0604020202020204" pitchFamily="34" charset="0"/>
+              </a:rPr>
+              <a:t>Cleanup</a:t>
+            </a:r>
+            <a:r>
+              <a:rPr lang="en-AU" sz="2800" b="1" dirty="0">
+                <a:latin typeface="Arial" panose="020B0604020202020204" pitchFamily="34" charset="0"/>
+                <a:cs typeface="Arial" panose="020B0604020202020204" pitchFamily="34" charset="0"/>
+              </a:rPr>
+              <a:t> and Exploration (</a:t>
+            </a:r>
+            <a:r>
+              <a:rPr lang="en-AU" sz="2800" b="1" dirty="0" err="1">
+                <a:latin typeface="Arial" panose="020B0604020202020204" pitchFamily="34" charset="0"/>
+                <a:cs typeface="Arial" panose="020B0604020202020204" pitchFamily="34" charset="0"/>
+              </a:rPr>
+              <a:t>cont</a:t>
+            </a:r>
+            <a:r>
+              <a:rPr lang="en-AU" sz="2800" b="1" dirty="0">
+                <a:latin typeface="Arial" panose="020B0604020202020204" pitchFamily="34" charset="0"/>
+                <a:cs typeface="Arial" panose="020B0604020202020204" pitchFamily="34" charset="0"/>
+              </a:rPr>
+              <a:t>)</a:t>
+            </a:r>
+            <a:endParaRPr lang="en-AU" sz="2800" dirty="0"/>
+          </a:p>
+        </p:txBody>
+      </p:sp>
+      <p:sp>
+        <p:nvSpPr>
+          <p:cNvPr id="3" name="Content Placeholder 2">
+            <a:extLst>
+              <a:ext uri="{FF2B5EF4-FFF2-40B4-BE49-F238E27FC236}">
+                <a16:creationId xmlns:a16="http://schemas.microsoft.com/office/drawing/2014/main" id="{65E02A14-AE9F-B8B3-CA65-CD301E6C9C3D}"/>
+              </a:ext>
+            </a:extLst>
+          </p:cNvPr>
+          <p:cNvSpPr>
+            <a:spLocks noGrp="1"/>
+          </p:cNvSpPr>
+          <p:nvPr>
+            <p:ph idx="1"/>
+          </p:nvPr>
+        </p:nvSpPr>
+        <p:spPr>
+          <a:xfrm>
+            <a:off x="838200" y="1477108"/>
+            <a:ext cx="10515600" cy="4699855"/>
+          </a:xfrm>
+        </p:spPr>
+        <p:txBody>
+          <a:bodyPr>
+            <a:normAutofit/>
+          </a:bodyPr>
+          <a:lstStyle/>
+          <a:p>
+            <a:pPr marL="0" indent="0">
+              <a:buNone/>
+            </a:pPr>
+            <a:r>
+              <a:rPr lang="en-AU" sz="2000" dirty="0">
+                <a:latin typeface="Arial" panose="020B0604020202020204" pitchFamily="34" charset="0"/>
+                <a:cs typeface="Arial" panose="020B0604020202020204" pitchFamily="34" charset="0"/>
+              </a:rPr>
+              <a:t>As we explore the different time series, we observe</a:t>
+            </a:r>
+          </a:p>
+          <a:p>
+            <a:r>
+              <a:rPr lang="en-AU" sz="2000" dirty="0">
+                <a:latin typeface="Arial" panose="020B0604020202020204" pitchFamily="34" charset="0"/>
+                <a:cs typeface="Arial" panose="020B0604020202020204" pitchFamily="34" charset="0"/>
+              </a:rPr>
+              <a:t>Time series are in different frequency. Consumption and expenditure is quarterly, unemployment data is monthly, saving ratio data is quarterly.</a:t>
+            </a:r>
+          </a:p>
+          <a:p>
+            <a:pPr marL="0" indent="0">
+              <a:buNone/>
+            </a:pPr>
+            <a:endParaRPr lang="en-AU" sz="2000" dirty="0">
+              <a:latin typeface="Arial" panose="020B0604020202020204" pitchFamily="34" charset="0"/>
+              <a:cs typeface="Arial" panose="020B0604020202020204" pitchFamily="34" charset="0"/>
+            </a:endParaRPr>
+          </a:p>
+        </p:txBody>
+      </p:sp>
+      <p:sp>
+        <p:nvSpPr>
+          <p:cNvPr id="6" name="TextBox 5">
+            <a:extLst>
+              <a:ext uri="{FF2B5EF4-FFF2-40B4-BE49-F238E27FC236}">
+                <a16:creationId xmlns:a16="http://schemas.microsoft.com/office/drawing/2014/main" id="{116B6B19-A9CB-91D3-EF61-29638C9C0EC6}"/>
+              </a:ext>
+            </a:extLst>
+          </p:cNvPr>
+          <p:cNvSpPr txBox="1"/>
+          <p:nvPr/>
+        </p:nvSpPr>
+        <p:spPr>
+          <a:xfrm>
+            <a:off x="920003" y="2965261"/>
+            <a:ext cx="10351994" cy="923330"/>
+          </a:xfrm>
+          <a:prstGeom prst="rect">
+            <a:avLst/>
+          </a:prstGeom>
+          <a:solidFill>
+            <a:schemeClr val="accent5">
+              <a:lumMod val="40000"/>
+              <a:lumOff val="60000"/>
+            </a:schemeClr>
+          </a:solidFill>
+          <a:ln>
+            <a:noFill/>
+          </a:ln>
+        </p:spPr>
+        <p:txBody>
+          <a:bodyPr wrap="square" rtlCol="0">
+            <a:spAutoFit/>
+          </a:bodyPr>
+          <a:lstStyle/>
+          <a:p>
+            <a:r>
+              <a:rPr lang="en-AU" b="1" dirty="0">
+                <a:latin typeface="Arial" panose="020B0604020202020204" pitchFamily="34" charset="0"/>
+                <a:cs typeface="Arial" panose="020B0604020202020204" pitchFamily="34" charset="0"/>
+              </a:rPr>
+              <a:t>Decision Point: </a:t>
+            </a:r>
+          </a:p>
+          <a:p>
+            <a:pPr marL="285750" indent="-285750">
+              <a:buFont typeface="Arial" panose="020B0604020202020204" pitchFamily="34" charset="0"/>
+              <a:buChar char="•"/>
+            </a:pPr>
+            <a:r>
+              <a:rPr lang="en-AU" dirty="0">
+                <a:latin typeface="Arial" panose="020B0604020202020204" pitchFamily="34" charset="0"/>
+                <a:cs typeface="Arial" panose="020B0604020202020204" pitchFamily="34" charset="0"/>
+              </a:rPr>
+              <a:t>What frequency should the study be?</a:t>
+            </a:r>
+            <a:br>
+              <a:rPr lang="en-AU" b="1" dirty="0">
+                <a:latin typeface="Arial" panose="020B0604020202020204" pitchFamily="34" charset="0"/>
+                <a:cs typeface="Arial" panose="020B0604020202020204" pitchFamily="34" charset="0"/>
+              </a:rPr>
+            </a:br>
+            <a:r>
+              <a:rPr lang="en-AU" dirty="0">
+                <a:latin typeface="Arial" panose="020B0604020202020204" pitchFamily="34" charset="0"/>
+                <a:cs typeface="Arial" panose="020B0604020202020204" pitchFamily="34" charset="0"/>
+              </a:rPr>
+              <a:t>Annually</a:t>
+            </a:r>
+          </a:p>
+        </p:txBody>
+      </p:sp>
+    </p:spTree>
+    <p:extLst>
+      <p:ext uri="{BB962C8B-B14F-4D97-AF65-F5344CB8AC3E}">
+        <p14:creationId xmlns:p14="http://schemas.microsoft.com/office/powerpoint/2010/main" val="2386266574"/>
+      </p:ext>
+    </p:extLst>
+  </p:cSld>
+  <p:clrMapOvr>
+    <a:masterClrMapping/>
+  </p:clrMapOvr>
+  <p:timing>
+    <p:tnLst>
+      <p:par>
+        <p:cTn id="1" dur="indefinite" restart="never" nodeType="tmRoot">
+          <p:childTnLst>
+            <p:seq concurrent="1" nextAc="seek">
+              <p:cTn id="2" dur="indefinite" nodeType="mainSeq">
+                <p:childTnLst>
+                  <p:par>
+                    <p:cTn id="3" fill="hold">
+                      <p:stCondLst>
+                        <p:cond delay="indefinite"/>
+                      </p:stCondLst>
+                      <p:childTnLst>
+                        <p:par>
+                          <p:cTn id="4" fill="hold">
+                            <p:stCondLst>
+                              <p:cond delay="0"/>
+                            </p:stCondLst>
+                            <p:childTnLst>
+                              <p:par>
+                                <p:cTn id="5" presetID="1" presetClass="entr" presetSubtype="0" fill="hold" grpId="0" nodeType="clickEffect">
+                                  <p:stCondLst>
+                                    <p:cond delay="0"/>
+                                  </p:stCondLst>
+                                  <p:childTnLst>
+                                    <p:set>
+                                      <p:cBhvr>
+                                        <p:cTn id="6" dur="1" fill="hold">
+                                          <p:stCondLst>
+                                            <p:cond delay="0"/>
+                                          </p:stCondLst>
+                                        </p:cTn>
+                                        <p:tgtEl>
+                                          <p:spTgt spid="6"/>
+                                        </p:tgtEl>
+                                        <p:attrNameLst>
+                                          <p:attrName>style.visibility</p:attrName>
+                                        </p:attrNameLst>
+                                      </p:cBhvr>
+                                      <p:to>
+                                        <p:strVal val="visible"/>
+                                      </p:to>
+                                    </p:set>
+                                  </p:childTnLst>
+                                </p:cTn>
+                              </p:par>
+                            </p:childTnLst>
+                          </p:cTn>
+                        </p:par>
+                      </p:childTnLst>
+                    </p:cTn>
+                  </p:par>
+                </p:childTnLst>
+              </p:cTn>
+              <p:prevCondLst>
+                <p:cond evt="onPrev" delay="0">
+                  <p:tgtEl>
+                    <p:sldTgt/>
+                  </p:tgtEl>
+                </p:cond>
+              </p:prevCondLst>
+              <p:nextCondLst>
+                <p:cond evt="onNext" delay="0">
+                  <p:tgtEl>
+                    <p:sldTgt/>
+                  </p:tgtEl>
+                </p:cond>
+              </p:nextCondLst>
+            </p:seq>
+          </p:childTnLst>
+        </p:cTn>
+      </p:par>
+    </p:tnLst>
+    <p:bldLst>
+      <p:bldP spid="6" grpId="0" animBg="1"/>
+    </p:bldLst>
+  </p:timing>
+</p:sld>
+</file>
+
+<file path=ppt/slides/slide6.xml><?xml version="1.0" encoding="utf-8"?>
+<p:sld xmlns:a="http://schemas.openxmlformats.org/drawingml/2006/main" xmlns:r="http://schemas.openxmlformats.org/officeDocument/2006/relationships" xmlns:p="http://schemas.openxmlformats.org/presentationml/2006/main">
+  <p:cSld>
+    <p:bg>
+      <p:bgPr>
+        <a:solidFill>
+          <a:schemeClr val="accent3">
+            <a:lumMod val="75000"/>
+          </a:schemeClr>
+        </a:solidFill>
+        <a:effectLst/>
+      </p:bgPr>
+    </p:bg>
+    <p:spTree>
+      <p:nvGrpSpPr>
+        <p:cNvPr id="1" name=""/>
+        <p:cNvGrpSpPr/>
+        <p:nvPr/>
+      </p:nvGrpSpPr>
+      <p:grpSpPr>
+        <a:xfrm>
+          <a:off x="0" y="0"/>
+          <a:ext cx="0" cy="0"/>
+          <a:chOff x="0" y="0"/>
+          <a:chExt cx="0" cy="0"/>
+        </a:xfrm>
+      </p:grpSpPr>
+      <p:sp>
+        <p:nvSpPr>
+          <p:cNvPr id="8" name="Rectangle 7">
+            <a:extLst>
+              <a:ext uri="{FF2B5EF4-FFF2-40B4-BE49-F238E27FC236}">
+                <a16:creationId xmlns:a16="http://schemas.microsoft.com/office/drawing/2014/main" id="{23207CC6-EAA1-4BFF-A48A-DECAD8972717}"/>
+              </a:ext>
+              <a:ext uri="{C183D7F6-B498-43B3-948B-1728B52AA6E4}">
+                <adec:decorative xmlns:adec="http://schemas.microsoft.com/office/drawing/2017/decorative" val="1"/>
+              </a:ext>
+            </a:extLst>
+          </p:cNvPr>
+          <p:cNvSpPr>
+            <a:spLocks noGrp="1" noRot="1" noChangeAspect="1" noMove="1" noResize="1" noEditPoints="1" noAdjustHandles="1" noChangeArrowheads="1" noChangeShapeType="1" noTextEdit="1"/>
+          </p:cNvSpPr>
+          <p:nvPr>
+            <p:extLst>
+              <p:ext uri="{386F3935-93C4-4BCD-93E2-E3B085C9AB24}">
+                <p16:designElem xmlns:p16="http://schemas.microsoft.com/office/powerpoint/2015/main" val="1"/>
+              </p:ext>
+            </p:extLst>
+          </p:nvPr>
+        </p:nvSpPr>
+        <p:spPr>
+          <a:xfrm>
+            <a:off x="0" y="-3324"/>
+            <a:ext cx="12192000" cy="6861324"/>
+          </a:xfrm>
+          <a:prstGeom prst="rect">
+            <a:avLst/>
+          </a:prstGeom>
+          <a:solidFill>
+            <a:srgbClr val="7F7F7F"/>
+          </a:solidFill>
+          <a:ln>
+            <a:noFill/>
+          </a:ln>
+        </p:spPr>
+        <p:style>
+          <a:lnRef idx="2">
+            <a:schemeClr val="accent1">
+              <a:shade val="50000"/>
+            </a:schemeClr>
+          </a:lnRef>
+          <a:fillRef idx="1">
+            <a:schemeClr val="accent1"/>
+          </a:fillRef>
+          <a:effectRef idx="0">
+            <a:schemeClr val="accent1"/>
+          </a:effectRef>
+          <a:fontRef idx="minor">
+            <a:schemeClr val="lt1"/>
+          </a:fontRef>
+        </p:style>
+        <p:txBody>
+          <a:bodyPr rtlCol="0" anchor="ctr"/>
+          <a:lstStyle/>
+          <a:p>
+            <a:pPr marL="0" marR="0" lvl="0" indent="0" algn="ctr" defTabSz="914400" rtl="0" eaLnBrk="1" fontAlgn="auto" latinLnBrk="0" hangingPunct="1">
+              <a:lnSpc>
+                <a:spcPct val="100000"/>
+              </a:lnSpc>
+              <a:spcBef>
+                <a:spcPts val="0"/>
+              </a:spcBef>
+              <a:spcAft>
+                <a:spcPts val="0"/>
+              </a:spcAft>
+              <a:buClrTx/>
+              <a:buSzTx/>
+              <a:buFontTx/>
+              <a:buNone/>
+              <a:tabLst/>
+              <a:defRPr/>
+            </a:pPr>
+            <a:endParaRPr kumimoji="0" lang="en-US" sz="1800" b="0" i="0" u="none" strike="noStrike" kern="1200" cap="none" spc="0" normalizeH="0" baseline="0" noProof="0">
+              <a:ln>
+                <a:noFill/>
+              </a:ln>
+              <a:solidFill>
+                <a:prstClr val="white"/>
+              </a:solidFill>
+              <a:effectLst/>
+              <a:uLnTx/>
+              <a:uFillTx/>
+              <a:latin typeface="Calibri" panose="020F0502020204030204"/>
+              <a:ea typeface="+mn-ea"/>
+              <a:cs typeface="+mn-cs"/>
+            </a:endParaRPr>
+          </a:p>
+        </p:txBody>
+      </p:sp>
+      <p:sp>
+        <p:nvSpPr>
+          <p:cNvPr id="10" name="Freeform 3">
+            <a:extLst>
+              <a:ext uri="{FF2B5EF4-FFF2-40B4-BE49-F238E27FC236}">
+                <a16:creationId xmlns:a16="http://schemas.microsoft.com/office/drawing/2014/main" id="{B234A3DD-923D-4166-8B19-7DD589908C68}"/>
+              </a:ext>
+              <a:ext uri="{C183D7F6-B498-43B3-948B-1728B52AA6E4}">
+                <adec:decorative xmlns:adec="http://schemas.microsoft.com/office/drawing/2017/decorative" val="1"/>
+              </a:ext>
+            </a:extLst>
+          </p:cNvPr>
+          <p:cNvSpPr>
+            <a:spLocks noGrp="1" noRot="1" noChangeAspect="1" noMove="1" noResize="1" noEditPoints="1" noAdjustHandles="1" noChangeArrowheads="1" noChangeShapeType="1" noTextEdit="1"/>
+          </p:cNvSpPr>
+          <p:nvPr>
+            <p:extLst>
+              <p:ext uri="{386F3935-93C4-4BCD-93E2-E3B085C9AB24}">
+                <p16:designElem xmlns:p16="http://schemas.microsoft.com/office/powerpoint/2015/main" val="1"/>
+              </p:ext>
+            </p:extLst>
+          </p:nvPr>
+        </p:nvSpPr>
+        <p:spPr>
+          <a:xfrm>
+            <a:off x="1246925" y="-479"/>
+            <a:ext cx="9468701" cy="6858478"/>
+          </a:xfrm>
+          <a:custGeom>
+            <a:avLst/>
+            <a:gdLst>
+              <a:gd name="connsiteX0" fmla="*/ 0 w 8078051"/>
+              <a:gd name="connsiteY0" fmla="*/ 0 h 5829300"/>
+              <a:gd name="connsiteX1" fmla="*/ 4453793 w 8078051"/>
+              <a:gd name="connsiteY1" fmla="*/ 0 h 5829300"/>
+              <a:gd name="connsiteX2" fmla="*/ 5363426 w 8078051"/>
+              <a:gd name="connsiteY2" fmla="*/ 0 h 5829300"/>
+              <a:gd name="connsiteX3" fmla="*/ 5368184 w 8078051"/>
+              <a:gd name="connsiteY3" fmla="*/ 0 h 5829300"/>
+              <a:gd name="connsiteX4" fmla="*/ 8078051 w 8078051"/>
+              <a:gd name="connsiteY4" fmla="*/ 5829300 h 5829300"/>
+              <a:gd name="connsiteX5" fmla="*/ 1743926 w 8078051"/>
+              <a:gd name="connsiteY5" fmla="*/ 5829300 h 5829300"/>
+              <a:gd name="connsiteX6" fmla="*/ 1744148 w 8078051"/>
+              <a:gd name="connsiteY6" fmla="*/ 5828822 h 5829300"/>
+              <a:gd name="connsiteX7" fmla="*/ 0 w 8078051"/>
+              <a:gd name="connsiteY7" fmla="*/ 5828822 h 5829300"/>
+            </a:gdLst>
+            <a:ahLst/>
+            <a:cxnLst>
+              <a:cxn ang="0">
+                <a:pos x="connsiteX0" y="connsiteY0"/>
+              </a:cxn>
+              <a:cxn ang="0">
+                <a:pos x="connsiteX1" y="connsiteY1"/>
+              </a:cxn>
+              <a:cxn ang="0">
+                <a:pos x="connsiteX2" y="connsiteY2"/>
+              </a:cxn>
+              <a:cxn ang="0">
+                <a:pos x="connsiteX3" y="connsiteY3"/>
+              </a:cxn>
+              <a:cxn ang="0">
+                <a:pos x="connsiteX4" y="connsiteY4"/>
+              </a:cxn>
+              <a:cxn ang="0">
+                <a:pos x="connsiteX5" y="connsiteY5"/>
+              </a:cxn>
+              <a:cxn ang="0">
+                <a:pos x="connsiteX6" y="connsiteY6"/>
+              </a:cxn>
+              <a:cxn ang="0">
+                <a:pos x="connsiteX7" y="connsiteY7"/>
+              </a:cxn>
+            </a:cxnLst>
+            <a:rect l="l" t="t" r="r" b="b"/>
+            <a:pathLst>
+              <a:path w="8078051" h="5829300">
+                <a:moveTo>
+                  <a:pt x="0" y="0"/>
+                </a:moveTo>
+                <a:lnTo>
+                  <a:pt x="4453793" y="0"/>
+                </a:lnTo>
+                <a:lnTo>
+                  <a:pt x="5363426" y="0"/>
+                </a:lnTo>
+                <a:lnTo>
+                  <a:pt x="5368184" y="0"/>
+                </a:lnTo>
+                <a:lnTo>
+                  <a:pt x="8078051" y="5829300"/>
+                </a:lnTo>
+                <a:lnTo>
+                  <a:pt x="1743926" y="5829300"/>
+                </a:lnTo>
+                <a:lnTo>
+                  <a:pt x="1744148" y="5828822"/>
+                </a:lnTo>
+                <a:lnTo>
+                  <a:pt x="0" y="5828822"/>
+                </a:lnTo>
+                <a:close/>
+              </a:path>
+            </a:pathLst>
+          </a:custGeom>
+          <a:solidFill>
+            <a:schemeClr val="bg1">
+              <a:lumMod val="85000"/>
+              <a:lumOff val="15000"/>
+              <a:alpha val="70000"/>
+            </a:schemeClr>
+          </a:solidFill>
+          <a:ln>
+            <a:noFill/>
+          </a:ln>
+        </p:spPr>
+        <p:style>
+          <a:lnRef idx="2">
+            <a:schemeClr val="accent1">
+              <a:shade val="50000"/>
+            </a:schemeClr>
+          </a:lnRef>
+          <a:fillRef idx="1">
+            <a:schemeClr val="accent1"/>
+          </a:fillRef>
+          <a:effectRef idx="0">
+            <a:schemeClr val="accent1"/>
+          </a:effectRef>
+          <a:fontRef idx="minor">
+            <a:schemeClr val="lt1"/>
+          </a:fontRef>
+        </p:style>
+        <p:txBody>
+          <a:bodyPr rtlCol="0" anchor="ctr"/>
+          <a:lstStyle/>
+          <a:p>
+            <a:pPr marL="0" marR="0" lvl="0" indent="0" algn="ctr" defTabSz="914400" rtl="0" eaLnBrk="1" fontAlgn="auto" latinLnBrk="0" hangingPunct="1">
+              <a:lnSpc>
+                <a:spcPct val="100000"/>
+              </a:lnSpc>
+              <a:spcBef>
+                <a:spcPts val="0"/>
+              </a:spcBef>
+              <a:spcAft>
+                <a:spcPts val="0"/>
+              </a:spcAft>
+              <a:buClrTx/>
+              <a:buSzTx/>
+              <a:buFontTx/>
+              <a:buNone/>
+              <a:tabLst/>
+              <a:defRPr/>
+            </a:pPr>
+            <a:endParaRPr kumimoji="0" lang="en-US" sz="1800" b="0" i="0" u="none" strike="noStrike" kern="1200" cap="none" spc="0" normalizeH="0" baseline="0" noProof="0">
+              <a:ln>
+                <a:noFill/>
+              </a:ln>
+              <a:solidFill>
+                <a:prstClr val="white"/>
+              </a:solidFill>
+              <a:effectLst/>
+              <a:uLnTx/>
+              <a:uFillTx/>
+              <a:latin typeface="Calibri" panose="020F0502020204030204"/>
+              <a:ea typeface="+mn-ea"/>
+              <a:cs typeface="+mn-cs"/>
+            </a:endParaRPr>
+          </a:p>
+        </p:txBody>
+      </p:sp>
+      <p:sp>
+        <p:nvSpPr>
+          <p:cNvPr id="12" name="Freeform: Shape 11">
+            <a:extLst>
+              <a:ext uri="{FF2B5EF4-FFF2-40B4-BE49-F238E27FC236}">
+                <a16:creationId xmlns:a16="http://schemas.microsoft.com/office/drawing/2014/main" id="{CA0A05FF-4BA9-494B-9164-2AD5AB36B1B4}"/>
+              </a:ext>
+              <a:ext uri="{C183D7F6-B498-43B3-948B-1728B52AA6E4}">
+                <adec:decorative xmlns:adec="http://schemas.microsoft.com/office/drawing/2017/decorative" val="1"/>
+              </a:ext>
+            </a:extLst>
+          </p:cNvPr>
+          <p:cNvSpPr>
+            <a:spLocks noGrp="1" noRot="1" noChangeAspect="1" noMove="1" noResize="1" noEditPoints="1" noAdjustHandles="1" noChangeArrowheads="1" noChangeShapeType="1" noTextEdit="1"/>
+          </p:cNvSpPr>
+          <p:nvPr>
+            <p:extLst>
+              <p:ext uri="{386F3935-93C4-4BCD-93E2-E3B085C9AB24}">
+                <p16:designElem xmlns:p16="http://schemas.microsoft.com/office/powerpoint/2015/main" val="1"/>
+              </p:ext>
+            </p:extLst>
+          </p:nvPr>
+        </p:nvSpPr>
+        <p:spPr>
+          <a:xfrm>
+            <a:off x="0" y="-480"/>
+            <a:ext cx="10086973" cy="6858958"/>
+          </a:xfrm>
+          <a:custGeom>
+            <a:avLst/>
+            <a:gdLst>
+              <a:gd name="connsiteX0" fmla="*/ 2008921 w 10086973"/>
+              <a:gd name="connsiteY0" fmla="*/ 0 h 6858958"/>
+              <a:gd name="connsiteX1" fmla="*/ 5838793 w 10086973"/>
+              <a:gd name="connsiteY1" fmla="*/ 0 h 6858958"/>
+              <a:gd name="connsiteX2" fmla="*/ 6905021 w 10086973"/>
+              <a:gd name="connsiteY2" fmla="*/ 0 h 6858958"/>
+              <a:gd name="connsiteX3" fmla="*/ 6910598 w 10086973"/>
+              <a:gd name="connsiteY3" fmla="*/ 0 h 6858958"/>
+              <a:gd name="connsiteX4" fmla="*/ 10086973 w 10086973"/>
+              <a:gd name="connsiteY4" fmla="*/ 6858478 h 6858958"/>
+              <a:gd name="connsiteX5" fmla="*/ 9324755 w 10086973"/>
+              <a:gd name="connsiteY5" fmla="*/ 6858478 h 6858958"/>
+              <a:gd name="connsiteX6" fmla="*/ 9324977 w 10086973"/>
+              <a:gd name="connsiteY6" fmla="*/ 6858957 h 6858958"/>
+              <a:gd name="connsiteX7" fmla="*/ 3359025 w 10086973"/>
+              <a:gd name="connsiteY7" fmla="*/ 6858957 h 6858958"/>
+              <a:gd name="connsiteX8" fmla="*/ 3359025 w 10086973"/>
+              <a:gd name="connsiteY8" fmla="*/ 6858958 h 6858958"/>
+              <a:gd name="connsiteX9" fmla="*/ 0 w 10086973"/>
+              <a:gd name="connsiteY9" fmla="*/ 6858958 h 6858958"/>
+              <a:gd name="connsiteX10" fmla="*/ 0 w 10086973"/>
+              <a:gd name="connsiteY10" fmla="*/ 958 h 6858958"/>
+              <a:gd name="connsiteX11" fmla="*/ 761996 w 10086973"/>
+              <a:gd name="connsiteY11" fmla="*/ 958 h 6858958"/>
+              <a:gd name="connsiteX12" fmla="*/ 761996 w 10086973"/>
+              <a:gd name="connsiteY12" fmla="*/ 479 h 6858958"/>
+              <a:gd name="connsiteX13" fmla="*/ 1246925 w 10086973"/>
+              <a:gd name="connsiteY13" fmla="*/ 479 h 6858958"/>
+              <a:gd name="connsiteX14" fmla="*/ 2008921 w 10086973"/>
+              <a:gd name="connsiteY14" fmla="*/ 479 h 6858958"/>
+            </a:gdLst>
+            <a:ahLst/>
+            <a:cxnLst>
+              <a:cxn ang="0">
+                <a:pos x="connsiteX0" y="connsiteY0"/>
+              </a:cxn>
+              <a:cxn ang="0">
+                <a:pos x="connsiteX1" y="connsiteY1"/>
+              </a:cxn>
+              <a:cxn ang="0">
+                <a:pos x="connsiteX2" y="connsiteY2"/>
+              </a:cxn>
+              <a:cxn ang="0">
+                <a:pos x="connsiteX3" y="connsiteY3"/>
+              </a:cxn>
+              <a:cxn ang="0">
+                <a:pos x="connsiteX4" y="connsiteY4"/>
+              </a:cxn>
+              <a:cxn ang="0">
+                <a:pos x="connsiteX5" y="connsiteY5"/>
+              </a:cxn>
+              <a:cxn ang="0">
+                <a:pos x="connsiteX6" y="connsiteY6"/>
+              </a:cxn>
+              <a:cxn ang="0">
+                <a:pos x="connsiteX7" y="connsiteY7"/>
+              </a:cxn>
+              <a:cxn ang="0">
+                <a:pos x="connsiteX8" y="connsiteY8"/>
+              </a:cxn>
+              <a:cxn ang="0">
+                <a:pos x="connsiteX9" y="connsiteY9"/>
+              </a:cxn>
+              <a:cxn ang="0">
+                <a:pos x="connsiteX10" y="connsiteY10"/>
+              </a:cxn>
+              <a:cxn ang="0">
+                <a:pos x="connsiteX11" y="connsiteY11"/>
+              </a:cxn>
+              <a:cxn ang="0">
+                <a:pos x="connsiteX12" y="connsiteY12"/>
+              </a:cxn>
+              <a:cxn ang="0">
+                <a:pos x="connsiteX13" y="connsiteY13"/>
+              </a:cxn>
+              <a:cxn ang="0">
+                <a:pos x="connsiteX14" y="connsiteY14"/>
+              </a:cxn>
+            </a:cxnLst>
+            <a:rect l="l" t="t" r="r" b="b"/>
+            <a:pathLst>
+              <a:path w="10086973" h="6858958">
+                <a:moveTo>
+                  <a:pt x="2008921" y="0"/>
+                </a:moveTo>
+                <a:lnTo>
+                  <a:pt x="5838793" y="0"/>
+                </a:lnTo>
+                <a:lnTo>
+                  <a:pt x="6905021" y="0"/>
+                </a:lnTo>
+                <a:lnTo>
+                  <a:pt x="6910598" y="0"/>
+                </a:lnTo>
+                <a:lnTo>
+                  <a:pt x="10086973" y="6858478"/>
+                </a:lnTo>
+                <a:lnTo>
+                  <a:pt x="9324755" y="6858478"/>
+                </a:lnTo>
+                <a:lnTo>
+                  <a:pt x="9324977" y="6858957"/>
+                </a:lnTo>
+                <a:lnTo>
+                  <a:pt x="3359025" y="6858957"/>
+                </a:lnTo>
+                <a:lnTo>
+                  <a:pt x="3359025" y="6858958"/>
+                </a:lnTo>
+                <a:lnTo>
+                  <a:pt x="0" y="6858958"/>
+                </a:lnTo>
+                <a:lnTo>
+                  <a:pt x="0" y="958"/>
+                </a:lnTo>
+                <a:lnTo>
+                  <a:pt x="761996" y="958"/>
+                </a:lnTo>
+                <a:lnTo>
+                  <a:pt x="761996" y="479"/>
+                </a:lnTo>
+                <a:lnTo>
+                  <a:pt x="1246925" y="479"/>
+                </a:lnTo>
+                <a:lnTo>
+                  <a:pt x="2008921" y="479"/>
+                </a:lnTo>
+                <a:close/>
+              </a:path>
+            </a:pathLst>
+          </a:custGeom>
+          <a:solidFill>
+            <a:schemeClr val="bg1">
+              <a:lumMod val="85000"/>
+              <a:lumOff val="15000"/>
+            </a:schemeClr>
+          </a:solidFill>
+          <a:ln>
+            <a:noFill/>
+          </a:ln>
+        </p:spPr>
+        <p:style>
+          <a:lnRef idx="2">
+            <a:schemeClr val="accent1">
+              <a:shade val="50000"/>
+            </a:schemeClr>
+          </a:lnRef>
+          <a:fillRef idx="1">
+            <a:schemeClr val="accent1"/>
+          </a:fillRef>
+          <a:effectRef idx="0">
+            <a:schemeClr val="accent1"/>
+          </a:effectRef>
+          <a:fontRef idx="minor">
+            <a:schemeClr val="lt1"/>
+          </a:fontRef>
+        </p:style>
+        <p:txBody>
+          <a:bodyPr wrap="square" rtlCol="0" anchor="ctr">
+            <a:noAutofit/>
+          </a:bodyPr>
+          <a:lstStyle/>
+          <a:p>
+            <a:pPr marL="0" marR="0" lvl="0" indent="0" algn="ctr" defTabSz="914400" rtl="0" eaLnBrk="1" fontAlgn="auto" latinLnBrk="0" hangingPunct="1">
+              <a:lnSpc>
+                <a:spcPct val="100000"/>
+              </a:lnSpc>
+              <a:spcBef>
+                <a:spcPts val="0"/>
+              </a:spcBef>
+              <a:spcAft>
+                <a:spcPts val="0"/>
+              </a:spcAft>
+              <a:buClrTx/>
+              <a:buSzTx/>
+              <a:buFontTx/>
+              <a:buNone/>
+              <a:tabLst/>
+              <a:defRPr/>
+            </a:pPr>
+            <a:endParaRPr kumimoji="0" lang="en-US" sz="1800" b="0" i="0" u="none" strike="noStrike" kern="1200" cap="none" spc="0" normalizeH="0" baseline="0" noProof="0">
+              <a:ln>
+                <a:noFill/>
+              </a:ln>
+              <a:solidFill>
+                <a:prstClr val="white"/>
+              </a:solidFill>
+              <a:effectLst/>
+              <a:uLnTx/>
+              <a:uFillTx/>
+              <a:latin typeface="Calibri" panose="020F0502020204030204"/>
+              <a:ea typeface="+mn-ea"/>
+              <a:cs typeface="+mn-cs"/>
+            </a:endParaRPr>
+          </a:p>
+        </p:txBody>
+      </p:sp>
+      <p:sp>
+        <p:nvSpPr>
+          <p:cNvPr id="2" name="Title 1">
+            <a:extLst>
+              <a:ext uri="{FF2B5EF4-FFF2-40B4-BE49-F238E27FC236}">
+                <a16:creationId xmlns:a16="http://schemas.microsoft.com/office/drawing/2014/main" id="{4AC9FD93-4679-6BF6-EE1F-455E43366624}"/>
+              </a:ext>
+            </a:extLst>
+          </p:cNvPr>
+          <p:cNvSpPr>
+            <a:spLocks noGrp="1"/>
+          </p:cNvSpPr>
+          <p:nvPr>
+            <p:ph type="title"/>
+          </p:nvPr>
+        </p:nvSpPr>
+        <p:spPr>
+          <a:xfrm>
+            <a:off x="804671" y="2425109"/>
+            <a:ext cx="6777229" cy="3307656"/>
+          </a:xfrm>
+        </p:spPr>
+        <p:txBody>
+          <a:bodyPr vert="horz" lIns="91440" tIns="45720" rIns="91440" bIns="45720" rtlCol="0" anchor="t">
+            <a:normAutofit/>
+          </a:bodyPr>
+          <a:lstStyle/>
+          <a:p>
+            <a:r>
+              <a:rPr lang="en-US" sz="7400" kern="1200">
+                <a:solidFill>
+                  <a:schemeClr val="tx1"/>
+                </a:solidFill>
+                <a:latin typeface="+mj-lt"/>
+                <a:ea typeface="+mj-ea"/>
+                <a:cs typeface="+mj-cs"/>
+              </a:rPr>
+              <a:t>Observations</a:t>
+            </a:r>
+          </a:p>
+        </p:txBody>
+      </p:sp>
+    </p:spTree>
+    <p:extLst>
+      <p:ext uri="{BB962C8B-B14F-4D97-AF65-F5344CB8AC3E}">
+        <p14:creationId xmlns:p14="http://schemas.microsoft.com/office/powerpoint/2010/main" val="3689150550"/>
+      </p:ext>
+    </p:extLst>
+  </p:cSld>
+  <p:clrMapOvr>
+    <a:overrideClrMapping bg1="dk1" tx1="lt1" bg2="dk2" tx2="lt2" accent1="accent1" accent2="accent2" accent3="accent3" accent4="accent4" accent5="accent5" accent6="accent6" hlink="hlink" folHlink="folHlink"/>
+  </p:clrMapOvr>
+</p:sld>
+</file>
+
+<file path=ppt/slides/slide7.xml><?xml version="1.0" encoding="utf-8"?>
+<p:sld xmlns:a="http://schemas.openxmlformats.org/drawingml/2006/main" xmlns:r="http://schemas.openxmlformats.org/officeDocument/2006/relationships" xmlns:p="http://schemas.openxmlformats.org/presentationml/2006/main">
+  <p:cSld>
+    <p:spTree>
+      <p:nvGrpSpPr>
+        <p:cNvPr id="1" name=""/>
+        <p:cNvGrpSpPr/>
+        <p:nvPr/>
+      </p:nvGrpSpPr>
+      <p:grpSpPr>
+        <a:xfrm>
+          <a:off x="0" y="0"/>
+          <a:ext cx="0" cy="0"/>
+          <a:chOff x="0" y="0"/>
+          <a:chExt cx="0" cy="0"/>
+        </a:xfrm>
+      </p:grpSpPr>
+      <p:sp>
+        <p:nvSpPr>
+          <p:cNvPr id="2" name="Title 1">
+            <a:extLst>
+              <a:ext uri="{FF2B5EF4-FFF2-40B4-BE49-F238E27FC236}">
                 <a16:creationId xmlns:a16="http://schemas.microsoft.com/office/drawing/2014/main" id="{5AEDFFF6-0746-82D8-D16F-D4BC7DADE3DE}"/>
               </a:ext>
             </a:extLst>
@@ -5403,7 +8273,7 @@
           </p:nvPr>
         </p:nvPicPr>
         <p:blipFill>
-          <a:blip r:embed="rId2">
+          <a:blip r:embed="rId3">
             <a:extLst>
               <a:ext uri="{28A0092B-C50C-407E-A947-70E740481C1C}">
                 <a14:useLocalDpi xmlns:a14="http://schemas.microsoft.com/office/drawing/2010/main" val="0"/>
@@ -5611,6 +8481,110 @@
               <a:rPr lang="en-AU" b="1" dirty="0"/>
               <a:t>Plateau</a:t>
             </a:r>
+          </a:p>
+        </p:txBody>
+      </p:sp>
+      <p:sp>
+        <p:nvSpPr>
+          <p:cNvPr id="3" name="Oval 2">
+            <a:extLst>
+              <a:ext uri="{FF2B5EF4-FFF2-40B4-BE49-F238E27FC236}">
+                <a16:creationId xmlns:a16="http://schemas.microsoft.com/office/drawing/2014/main" id="{35FF7615-883B-E0B6-2E07-B949898FCF5B}"/>
+              </a:ext>
+            </a:extLst>
+          </p:cNvPr>
+          <p:cNvSpPr/>
+          <p:nvPr/>
+        </p:nvSpPr>
+        <p:spPr>
+          <a:xfrm>
+            <a:off x="8710523" y="3243259"/>
+            <a:ext cx="580815" cy="587141"/>
+          </a:xfrm>
+          <a:prstGeom prst="ellipse">
+            <a:avLst/>
+          </a:prstGeom>
+          <a:noFill/>
+          <a:ln>
+            <a:solidFill>
+              <a:srgbClr val="FF0000"/>
+            </a:solidFill>
+          </a:ln>
+        </p:spPr>
+        <p:style>
+          <a:lnRef idx="2">
+            <a:schemeClr val="accent1">
+              <a:shade val="50000"/>
+            </a:schemeClr>
+          </a:lnRef>
+          <a:fillRef idx="1">
+            <a:schemeClr val="accent1"/>
+          </a:fillRef>
+          <a:effectRef idx="0">
+            <a:schemeClr val="accent1"/>
+          </a:effectRef>
+          <a:fontRef idx="minor">
+            <a:schemeClr val="lt1"/>
+          </a:fontRef>
+        </p:style>
+        <p:txBody>
+          <a:bodyPr rtlCol="0" anchor="ctr"/>
+          <a:lstStyle/>
+          <a:p>
+            <a:pPr algn="ctr"/>
+            <a:endParaRPr lang="en-AU"/>
+          </a:p>
+        </p:txBody>
+      </p:sp>
+      <p:sp>
+        <p:nvSpPr>
+          <p:cNvPr id="4" name="Oval 3">
+            <a:extLst>
+              <a:ext uri="{FF2B5EF4-FFF2-40B4-BE49-F238E27FC236}">
+                <a16:creationId xmlns:a16="http://schemas.microsoft.com/office/drawing/2014/main" id="{10A471A5-3B92-EE31-37D9-98DE80037116}"/>
+              </a:ext>
+            </a:extLst>
+          </p:cNvPr>
+          <p:cNvSpPr/>
+          <p:nvPr/>
+        </p:nvSpPr>
+        <p:spPr>
+          <a:xfrm>
+            <a:off x="7850284" y="4432473"/>
+            <a:ext cx="615102" cy="524858"/>
+          </a:xfrm>
+          <a:prstGeom prst="ellipse">
+            <a:avLst/>
+          </a:prstGeom>
+          <a:noFill/>
+          <a:ln>
+            <a:solidFill>
+              <a:srgbClr val="FF0000"/>
+            </a:solidFill>
+          </a:ln>
+        </p:spPr>
+        <p:style>
+          <a:lnRef idx="2">
+            <a:schemeClr val="accent1">
+              <a:shade val="50000"/>
+            </a:schemeClr>
+          </a:lnRef>
+          <a:fillRef idx="1">
+            <a:schemeClr val="accent1"/>
+          </a:fillRef>
+          <a:effectRef idx="0">
+            <a:schemeClr val="accent1"/>
+          </a:effectRef>
+          <a:fontRef idx="minor">
+            <a:schemeClr val="lt1"/>
+          </a:fontRef>
+        </p:style>
+        <p:txBody>
+          <a:bodyPr rtlCol="0" anchor="ctr"/>
+          <a:lstStyle/>
+          <a:p>
+            <a:pPr algn="ctr"/>
+            <a:endParaRPr lang="en-AU"/>
           </a:p>
         </p:txBody>
       </p:sp>
@@ -5890,7 +8864,7 @@
 </p:sld>
 </file>
 
-<file path=ppt/slides/slide6.xml><?xml version="1.0" encoding="utf-8"?>
+<file path=ppt/slides/slide8.xml><?xml version="1.0" encoding="utf-8"?>
 <p:sld xmlns:a="http://schemas.openxmlformats.org/drawingml/2006/main" xmlns:r="http://schemas.openxmlformats.org/officeDocument/2006/relationships" xmlns:p="http://schemas.openxmlformats.org/presentationml/2006/main">
   <p:cSld>
     <p:bg>
@@ -6220,7 +9194,7 @@
           </p:nvPr>
         </p:nvPicPr>
         <p:blipFill>
-          <a:blip r:embed="rId2"/>
+          <a:blip r:embed="rId3"/>
           <a:stretch>
             <a:fillRect/>
           </a:stretch>
@@ -6331,7 +9305,7 @@
 </p:sld>
 </file>
 
-<file path=ppt/slides/slide7.xml><?xml version="1.0" encoding="utf-8"?>
+<file path=ppt/slides/slide9.xml><?xml version="1.0" encoding="utf-8"?>
 <p:sld xmlns:a="http://schemas.openxmlformats.org/drawingml/2006/main" xmlns:r="http://schemas.openxmlformats.org/officeDocument/2006/relationships" xmlns:p="http://schemas.openxmlformats.org/presentationml/2006/main">
   <p:cSld>
     <p:bg>
@@ -7152,130 +10126,30 @@
           </a:p>
         </p:txBody>
       </p:sp>
-    </p:spTree>
-    <p:extLst>
-      <p:ext uri="{BB962C8B-B14F-4D97-AF65-F5344CB8AC3E}">
-        <p14:creationId xmlns:p14="http://schemas.microsoft.com/office/powerpoint/2010/main" val="2224726975"/>
-      </p:ext>
-    </p:extLst>
-  </p:cSld>
-  <p:clrMapOvr>
-    <a:masterClrMapping/>
-  </p:clrMapOvr>
-</p:sld>
-</file>
-
-<file path=ppt/slides/slide8.xml><?xml version="1.0" encoding="utf-8"?>
-<p:sld xmlns:a="http://schemas.openxmlformats.org/drawingml/2006/main" xmlns:r="http://schemas.openxmlformats.org/officeDocument/2006/relationships" xmlns:p="http://schemas.openxmlformats.org/presentationml/2006/main">
-  <p:cSld>
-    <p:spTree>
-      <p:nvGrpSpPr>
-        <p:cNvPr id="1" name=""/>
-        <p:cNvGrpSpPr/>
-        <p:nvPr/>
-      </p:nvGrpSpPr>
-      <p:grpSpPr>
-        <a:xfrm>
-          <a:off x="0" y="0"/>
-          <a:ext cx="0" cy="0"/>
-          <a:chOff x="0" y="0"/>
-          <a:chExt cx="0" cy="0"/>
-        </a:xfrm>
-      </p:grpSpPr>
-      <p:sp>
-        <p:nvSpPr>
-          <p:cNvPr id="2" name="Title 1">
-            <a:extLst>
-              <a:ext uri="{FF2B5EF4-FFF2-40B4-BE49-F238E27FC236}">
-                <a16:creationId xmlns:a16="http://schemas.microsoft.com/office/drawing/2014/main" id="{5AEDFFF6-0746-82D8-D16F-D4BC7DADE3DE}"/>
-              </a:ext>
-            </a:extLst>
-          </p:cNvPr>
-          <p:cNvSpPr>
-            <a:spLocks noGrp="1"/>
-          </p:cNvSpPr>
-          <p:nvPr>
-            <p:ph type="title"/>
-          </p:nvPr>
+      <p:sp>
+        <p:nvSpPr>
+          <p:cNvPr id="2" name="Speech Bubble: Rectangle 1">
+            <a:extLst>
+              <a:ext uri="{FF2B5EF4-FFF2-40B4-BE49-F238E27FC236}">
+                <a16:creationId xmlns:a16="http://schemas.microsoft.com/office/drawing/2014/main" id="{A31FA700-96CF-A37F-FC38-6832C876A25B}"/>
+              </a:ext>
+            </a:extLst>
+          </p:cNvPr>
+          <p:cNvSpPr/>
+          <p:nvPr/>
         </p:nvSpPr>
         <p:spPr>
           <a:xfrm>
-            <a:off x="838200" y="365125"/>
-            <a:ext cx="10515600" cy="691700"/>
+            <a:off x="908937" y="5694559"/>
+            <a:ext cx="2113280" cy="655442"/>
           </a:xfrm>
-        </p:spPr>
-        <p:txBody>
-          <a:bodyPr>
-            <a:normAutofit fontScale="90000"/>
-          </a:bodyPr>
-          <a:lstStyle/>
-          <a:p>
-            <a:endParaRPr lang="en-AU" dirty="0"/>
-          </a:p>
-        </p:txBody>
-      </p:sp>
-      <p:pic>
-        <p:nvPicPr>
-          <p:cNvPr id="5" name="Content Placeholder 4" descr="Chart, bar chart&#10;&#10;Description automatically generated">
-            <a:extLst>
-              <a:ext uri="{FF2B5EF4-FFF2-40B4-BE49-F238E27FC236}">
-                <a16:creationId xmlns:a16="http://schemas.microsoft.com/office/drawing/2014/main" id="{145E8985-1C84-64C9-3B29-6FDB01CA8398}"/>
-              </a:ext>
-            </a:extLst>
-          </p:cNvPr>
-          <p:cNvPicPr>
-            <a:picLocks noGrp="1" noChangeAspect="1"/>
-          </p:cNvPicPr>
-          <p:nvPr>
-            <p:ph idx="1"/>
-          </p:nvPr>
-        </p:nvPicPr>
-        <p:blipFill>
-          <a:blip r:embed="rId2">
-            <a:extLst>
-              <a:ext uri="{28A0092B-C50C-407E-A947-70E740481C1C}">
-                <a14:useLocalDpi xmlns:a14="http://schemas.microsoft.com/office/drawing/2010/main" val="0"/>
-              </a:ext>
-            </a:extLst>
-          </a:blip>
-          <a:stretch>
-            <a:fillRect/>
-          </a:stretch>
-        </p:blipFill>
-        <p:spPr>
-          <a:xfrm>
-            <a:off x="259533" y="1932317"/>
-            <a:ext cx="11672934" cy="3256210"/>
-          </a:xfrm>
-        </p:spPr>
-      </p:pic>
-      <p:sp>
-        <p:nvSpPr>
-          <p:cNvPr id="6" name="Rectangle 5">
-            <a:extLst>
-              <a:ext uri="{FF2B5EF4-FFF2-40B4-BE49-F238E27FC236}">
-                <a16:creationId xmlns:a16="http://schemas.microsoft.com/office/drawing/2014/main" id="{80E37D0A-6AAE-77CF-2668-C5B4CEEEDBAB}"/>
-              </a:ext>
-            </a:extLst>
-          </p:cNvPr>
-          <p:cNvSpPr/>
-          <p:nvPr/>
-        </p:nvSpPr>
-        <p:spPr>
-          <a:xfrm>
-            <a:off x="1061049" y="3994030"/>
-            <a:ext cx="655608" cy="1311215"/>
-          </a:xfrm>
-          <a:prstGeom prst="rect">
-            <a:avLst/>
+          <a:prstGeom prst="wedgeRectCallout">
+            <a:avLst>
+              <a:gd name="adj1" fmla="val -11217"/>
+              <a:gd name="adj2" fmla="val -150278"/>
+            </a:avLst>
           </a:prstGeom>
           <a:noFill/>
-          <a:ln w="19050">
-            <a:solidFill>
-              <a:srgbClr val="FF0000"/>
-            </a:solidFill>
-            <a:prstDash val="sysDash"/>
-          </a:ln>
         </p:spPr>
         <p:style>
           <a:lnRef idx="2">
@@ -7298,16 +10172,25 @@
           <a:lstStyle/>
           <a:p>
             <a:pPr algn="ctr"/>
-            <a:endParaRPr lang="en-AU"/>
-          </a:p>
-        </p:txBody>
-      </p:sp>
-      <p:sp>
-        <p:nvSpPr>
-          <p:cNvPr id="7" name="Rectangle 6">
-            <a:extLst>
-              <a:ext uri="{FF2B5EF4-FFF2-40B4-BE49-F238E27FC236}">
-                <a16:creationId xmlns:a16="http://schemas.microsoft.com/office/drawing/2014/main" id="{A6BF3056-5979-C00F-FD14-036C4D47811D}"/>
+            <a:r>
+              <a:rPr lang="en-AU" sz="1400" dirty="0">
+                <a:solidFill>
+                  <a:schemeClr val="tx1"/>
+                </a:solidFill>
+                <a:latin typeface="Arial" panose="020B0604020202020204" pitchFamily="34" charset="0"/>
+                <a:cs typeface="Arial" panose="020B0604020202020204" pitchFamily="34" charset="0"/>
+              </a:rPr>
+              <a:t>Spending on communication almost double in 10 years time</a:t>
+            </a:r>
+          </a:p>
+        </p:txBody>
+      </p:sp>
+      <p:sp>
+        <p:nvSpPr>
+          <p:cNvPr id="3" name="Speech Bubble: Rectangle 2">
+            <a:extLst>
+              <a:ext uri="{FF2B5EF4-FFF2-40B4-BE49-F238E27FC236}">
+                <a16:creationId xmlns:a16="http://schemas.microsoft.com/office/drawing/2014/main" id="{FCC42035-5662-74F0-61B6-1D5C06200190}"/>
               </a:ext>
             </a:extLst>
           </p:cNvPr>
@@ -7316,19 +10199,16 @@
         </p:nvSpPr>
         <p:spPr>
           <a:xfrm>
-            <a:off x="7769525" y="4118942"/>
-            <a:ext cx="655608" cy="1186304"/>
+            <a:off x="5105223" y="1803261"/>
+            <a:ext cx="2193770" cy="655442"/>
           </a:xfrm>
-          <a:prstGeom prst="rect">
-            <a:avLst/>
+          <a:prstGeom prst="wedgeRectCallout">
+            <a:avLst>
+              <a:gd name="adj1" fmla="val -54486"/>
+              <a:gd name="adj2" fmla="val 74486"/>
+            </a:avLst>
           </a:prstGeom>
           <a:noFill/>
-          <a:ln w="19050">
-            <a:solidFill>
-              <a:srgbClr val="FF0000"/>
-            </a:solidFill>
-            <a:prstDash val="sysDash"/>
-          </a:ln>
         </p:spPr>
         <p:style>
           <a:lnRef idx="2">
@@ -7351,396 +10231,23 @@
           <a:lstStyle/>
           <a:p>
             <a:pPr algn="ctr"/>
-            <a:endParaRPr lang="en-AU"/>
-          </a:p>
-        </p:txBody>
-      </p:sp>
-      <p:sp>
-        <p:nvSpPr>
-          <p:cNvPr id="8" name="Rectangle 7">
-            <a:extLst>
-              <a:ext uri="{FF2B5EF4-FFF2-40B4-BE49-F238E27FC236}">
-                <a16:creationId xmlns:a16="http://schemas.microsoft.com/office/drawing/2014/main" id="{2E5953DD-115C-E20F-29FD-0243D661EC87}"/>
-              </a:ext>
-            </a:extLst>
-          </p:cNvPr>
-          <p:cNvSpPr/>
-          <p:nvPr/>
-        </p:nvSpPr>
-        <p:spPr>
-          <a:xfrm>
-            <a:off x="707366" y="3429000"/>
-            <a:ext cx="353684" cy="388189"/>
-          </a:xfrm>
-          <a:prstGeom prst="rect">
-            <a:avLst/>
-          </a:prstGeom>
-          <a:noFill/>
-          <a:ln w="28575">
-            <a:solidFill>
-              <a:srgbClr val="002060"/>
-            </a:solidFill>
-            <a:prstDash val="sysDot"/>
-          </a:ln>
-        </p:spPr>
-        <p:style>
-          <a:lnRef idx="2">
-            <a:schemeClr val="accent1">
-              <a:shade val="50000"/>
-            </a:schemeClr>
-          </a:lnRef>
-          <a:fillRef idx="1">
-            <a:schemeClr val="accent1"/>
-          </a:fillRef>
-          <a:effectRef idx="0">
-            <a:schemeClr val="accent1"/>
-          </a:effectRef>
-          <a:fontRef idx="minor">
-            <a:schemeClr val="lt1"/>
-          </a:fontRef>
-        </p:style>
-        <p:txBody>
-          <a:bodyPr rtlCol="0" anchor="ctr"/>
-          <a:lstStyle/>
-          <a:p>
-            <a:pPr algn="ctr"/>
-            <a:endParaRPr lang="en-AU"/>
-          </a:p>
-        </p:txBody>
-      </p:sp>
-      <p:sp>
-        <p:nvSpPr>
-          <p:cNvPr id="9" name="Rectangle 8">
-            <a:extLst>
-              <a:ext uri="{FF2B5EF4-FFF2-40B4-BE49-F238E27FC236}">
-                <a16:creationId xmlns:a16="http://schemas.microsoft.com/office/drawing/2014/main" id="{96FF3FE0-5B92-6576-78FA-1E81B0CA0751}"/>
-              </a:ext>
-            </a:extLst>
-          </p:cNvPr>
-          <p:cNvSpPr/>
-          <p:nvPr/>
-        </p:nvSpPr>
-        <p:spPr>
-          <a:xfrm>
-            <a:off x="3404558" y="2304691"/>
-            <a:ext cx="353684" cy="388189"/>
-          </a:xfrm>
-          <a:prstGeom prst="rect">
-            <a:avLst/>
-          </a:prstGeom>
-          <a:noFill/>
-          <a:ln w="28575">
-            <a:solidFill>
-              <a:srgbClr val="002060"/>
-            </a:solidFill>
-            <a:prstDash val="sysDot"/>
-          </a:ln>
-        </p:spPr>
-        <p:style>
-          <a:lnRef idx="2">
-            <a:schemeClr val="accent1">
-              <a:shade val="50000"/>
-            </a:schemeClr>
-          </a:lnRef>
-          <a:fillRef idx="1">
-            <a:schemeClr val="accent1"/>
-          </a:fillRef>
-          <a:effectRef idx="0">
-            <a:schemeClr val="accent1"/>
-          </a:effectRef>
-          <a:fontRef idx="minor">
-            <a:schemeClr val="lt1"/>
-          </a:fontRef>
-        </p:style>
-        <p:txBody>
-          <a:bodyPr rtlCol="0" anchor="ctr"/>
-          <a:lstStyle/>
-          <a:p>
-            <a:pPr algn="ctr"/>
-            <a:endParaRPr lang="en-AU"/>
-          </a:p>
-        </p:txBody>
-      </p:sp>
-      <p:sp>
-        <p:nvSpPr>
-          <p:cNvPr id="10" name="Rectangle 9">
-            <a:extLst>
-              <a:ext uri="{FF2B5EF4-FFF2-40B4-BE49-F238E27FC236}">
-                <a16:creationId xmlns:a16="http://schemas.microsoft.com/office/drawing/2014/main" id="{BB2B8582-6183-42E9-A0B3-4AAFC00F9F51}"/>
-              </a:ext>
-            </a:extLst>
-          </p:cNvPr>
-          <p:cNvSpPr/>
-          <p:nvPr/>
-        </p:nvSpPr>
-        <p:spPr>
-          <a:xfrm>
-            <a:off x="10107283" y="3924846"/>
-            <a:ext cx="353684" cy="388189"/>
-          </a:xfrm>
-          <a:prstGeom prst="rect">
-            <a:avLst/>
-          </a:prstGeom>
-          <a:noFill/>
-          <a:ln w="28575">
-            <a:solidFill>
-              <a:srgbClr val="002060"/>
-            </a:solidFill>
-            <a:prstDash val="sysDot"/>
-          </a:ln>
-        </p:spPr>
-        <p:style>
-          <a:lnRef idx="2">
-            <a:schemeClr val="accent1">
-              <a:shade val="50000"/>
-            </a:schemeClr>
-          </a:lnRef>
-          <a:fillRef idx="1">
-            <a:schemeClr val="accent1"/>
-          </a:fillRef>
-          <a:effectRef idx="0">
-            <a:schemeClr val="accent1"/>
-          </a:effectRef>
-          <a:fontRef idx="minor">
-            <a:schemeClr val="lt1"/>
-          </a:fontRef>
-        </p:style>
-        <p:txBody>
-          <a:bodyPr rtlCol="0" anchor="ctr"/>
-          <a:lstStyle/>
-          <a:p>
-            <a:pPr algn="ctr"/>
-            <a:endParaRPr lang="en-AU"/>
-          </a:p>
-        </p:txBody>
-      </p:sp>
-      <p:sp>
-        <p:nvSpPr>
-          <p:cNvPr id="12" name="Rectangle 11">
-            <a:extLst>
-              <a:ext uri="{FF2B5EF4-FFF2-40B4-BE49-F238E27FC236}">
-                <a16:creationId xmlns:a16="http://schemas.microsoft.com/office/drawing/2014/main" id="{1EA06623-AD0D-223A-9FDB-08ED5D9F3931}"/>
-              </a:ext>
-            </a:extLst>
-          </p:cNvPr>
-          <p:cNvSpPr/>
-          <p:nvPr/>
-        </p:nvSpPr>
-        <p:spPr>
-          <a:xfrm>
-            <a:off x="7415841" y="4261448"/>
-            <a:ext cx="353684" cy="388189"/>
-          </a:xfrm>
-          <a:prstGeom prst="rect">
-            <a:avLst/>
-          </a:prstGeom>
-          <a:noFill/>
-          <a:ln w="28575">
-            <a:solidFill>
-              <a:srgbClr val="002060"/>
-            </a:solidFill>
-            <a:prstDash val="sysDot"/>
-          </a:ln>
-        </p:spPr>
-        <p:style>
-          <a:lnRef idx="2">
-            <a:schemeClr val="accent1">
-              <a:shade val="50000"/>
-            </a:schemeClr>
-          </a:lnRef>
-          <a:fillRef idx="1">
-            <a:schemeClr val="accent1"/>
-          </a:fillRef>
-          <a:effectRef idx="0">
-            <a:schemeClr val="accent1"/>
-          </a:effectRef>
-          <a:fontRef idx="minor">
-            <a:schemeClr val="lt1"/>
-          </a:fontRef>
-        </p:style>
-        <p:txBody>
-          <a:bodyPr rtlCol="0" anchor="ctr"/>
-          <a:lstStyle/>
-          <a:p>
-            <a:pPr algn="ctr"/>
-            <a:endParaRPr lang="en-AU"/>
-          </a:p>
-        </p:txBody>
-      </p:sp>
-      <p:sp>
-        <p:nvSpPr>
-          <p:cNvPr id="13" name="Rectangle 12">
-            <a:extLst>
-              <a:ext uri="{FF2B5EF4-FFF2-40B4-BE49-F238E27FC236}">
-                <a16:creationId xmlns:a16="http://schemas.microsoft.com/office/drawing/2014/main" id="{C4BA45EA-6910-4C92-DBC3-788E66597FC7}"/>
-              </a:ext>
-            </a:extLst>
-          </p:cNvPr>
-          <p:cNvSpPr/>
-          <p:nvPr/>
-        </p:nvSpPr>
-        <p:spPr>
-          <a:xfrm>
-            <a:off x="9451675" y="3935588"/>
-            <a:ext cx="353684" cy="388189"/>
-          </a:xfrm>
-          <a:prstGeom prst="rect">
-            <a:avLst/>
-          </a:prstGeom>
-          <a:noFill/>
-          <a:ln w="28575">
-            <a:solidFill>
-              <a:srgbClr val="002060"/>
-            </a:solidFill>
-            <a:prstDash val="sysDot"/>
-          </a:ln>
-        </p:spPr>
-        <p:style>
-          <a:lnRef idx="2">
-            <a:schemeClr val="accent1">
-              <a:shade val="50000"/>
-            </a:schemeClr>
-          </a:lnRef>
-          <a:fillRef idx="1">
-            <a:schemeClr val="accent1"/>
-          </a:fillRef>
-          <a:effectRef idx="0">
-            <a:schemeClr val="accent1"/>
-          </a:effectRef>
-          <a:fontRef idx="minor">
-            <a:schemeClr val="lt1"/>
-          </a:fontRef>
-        </p:style>
-        <p:txBody>
-          <a:bodyPr rtlCol="0" anchor="ctr"/>
-          <a:lstStyle/>
-          <a:p>
-            <a:pPr algn="ctr"/>
-            <a:endParaRPr lang="en-AU"/>
+            <a:r>
+              <a:rPr lang="en-AU" sz="1400" dirty="0">
+                <a:solidFill>
+                  <a:schemeClr val="tx1"/>
+                </a:solidFill>
+                <a:latin typeface="Arial" panose="020B0604020202020204" pitchFamily="34" charset="0"/>
+                <a:cs typeface="Arial" panose="020B0604020202020204" pitchFamily="34" charset="0"/>
+              </a:rPr>
+              <a:t>Spending on tobacco almost half in 10 years time</a:t>
+            </a:r>
           </a:p>
         </p:txBody>
       </p:sp>
     </p:spTree>
     <p:extLst>
       <p:ext uri="{BB962C8B-B14F-4D97-AF65-F5344CB8AC3E}">
-        <p14:creationId xmlns:p14="http://schemas.microsoft.com/office/powerpoint/2010/main" val="4126747790"/>
-      </p:ext>
-    </p:extLst>
-  </p:cSld>
-  <p:clrMapOvr>
-    <a:masterClrMapping/>
-  </p:clrMapOvr>
-</p:sld>
-</file>
-
-<file path=ppt/slides/slide9.xml><?xml version="1.0" encoding="utf-8"?>
-<p:sld xmlns:a="http://schemas.openxmlformats.org/drawingml/2006/main" xmlns:r="http://schemas.openxmlformats.org/officeDocument/2006/relationships" xmlns:p="http://schemas.openxmlformats.org/presentationml/2006/main">
-  <p:cSld>
-    <p:spTree>
-      <p:nvGrpSpPr>
-        <p:cNvPr id="1" name=""/>
-        <p:cNvGrpSpPr/>
-        <p:nvPr/>
-      </p:nvGrpSpPr>
-      <p:grpSpPr>
-        <a:xfrm>
-          <a:off x="0" y="0"/>
-          <a:ext cx="0" cy="0"/>
-          <a:chOff x="0" y="0"/>
-          <a:chExt cx="0" cy="0"/>
-        </a:xfrm>
-      </p:grpSpPr>
-      <p:sp>
-        <p:nvSpPr>
-          <p:cNvPr id="7" name="Title 6">
-            <a:extLst>
-              <a:ext uri="{FF2B5EF4-FFF2-40B4-BE49-F238E27FC236}">
-                <a16:creationId xmlns:a16="http://schemas.microsoft.com/office/drawing/2014/main" id="{9E638611-D19B-63DC-0147-418A705E87B4}"/>
-              </a:ext>
-            </a:extLst>
-          </p:cNvPr>
-          <p:cNvSpPr>
-            <a:spLocks noGrp="1"/>
-          </p:cNvSpPr>
-          <p:nvPr>
-            <p:ph type="title"/>
-          </p:nvPr>
-        </p:nvSpPr>
-        <p:spPr/>
-        <p:txBody>
-          <a:bodyPr/>
-          <a:lstStyle/>
-          <a:p>
-            <a:endParaRPr lang="en-AU"/>
-          </a:p>
-        </p:txBody>
-      </p:sp>
-      <p:sp>
-        <p:nvSpPr>
-          <p:cNvPr id="9" name="Content Placeholder 8">
-            <a:extLst>
-              <a:ext uri="{FF2B5EF4-FFF2-40B4-BE49-F238E27FC236}">
-                <a16:creationId xmlns:a16="http://schemas.microsoft.com/office/drawing/2014/main" id="{5E9F799D-EE2C-4CCD-16EC-E70569837FC1}"/>
-              </a:ext>
-            </a:extLst>
-          </p:cNvPr>
-          <p:cNvSpPr>
-            <a:spLocks noGrp="1"/>
-          </p:cNvSpPr>
-          <p:nvPr>
-            <p:ph sz="half" idx="2"/>
-          </p:nvPr>
-        </p:nvSpPr>
-        <p:spPr/>
-        <p:txBody>
-          <a:bodyPr>
-            <a:normAutofit/>
-          </a:bodyPr>
-          <a:lstStyle/>
-          <a:p>
-            <a:pPr marL="0" indent="0">
-              <a:buNone/>
-            </a:pPr>
-            <a:r>
-              <a:rPr lang="en-AU" sz="2000" b="1" dirty="0"/>
-              <a:t>Hypothesis:</a:t>
-            </a:r>
-          </a:p>
-        </p:txBody>
-      </p:sp>
-      <p:pic>
-        <p:nvPicPr>
-          <p:cNvPr id="15" name="Content Placeholder 14">
-            <a:extLst>
-              <a:ext uri="{FF2B5EF4-FFF2-40B4-BE49-F238E27FC236}">
-                <a16:creationId xmlns:a16="http://schemas.microsoft.com/office/drawing/2014/main" id="{0BC59CEE-94BD-B9CC-F2ED-B301DBC61557}"/>
-              </a:ext>
-            </a:extLst>
-          </p:cNvPr>
-          <p:cNvPicPr>
-            <a:picLocks noGrp="1" noChangeAspect="1"/>
-          </p:cNvPicPr>
-          <p:nvPr>
-            <p:ph sz="half" idx="1"/>
-          </p:nvPr>
-        </p:nvPicPr>
-        <p:blipFill>
-          <a:blip r:embed="rId2"/>
-          <a:stretch>
-            <a:fillRect/>
-          </a:stretch>
-        </p:blipFill>
-        <p:spPr>
-          <a:xfrm>
-            <a:off x="431777" y="1926540"/>
-            <a:ext cx="5310838" cy="4250423"/>
-          </a:xfrm>
-        </p:spPr>
-      </p:pic>
-    </p:spTree>
-    <p:extLst>
-      <p:ext uri="{BB962C8B-B14F-4D97-AF65-F5344CB8AC3E}">
-        <p14:creationId xmlns:p14="http://schemas.microsoft.com/office/powerpoint/2010/main" val="1100476953"/>
+        <p14:creationId xmlns:p14="http://schemas.microsoft.com/office/powerpoint/2010/main" val="2224726975"/>
       </p:ext>
     </p:extLst>
   </p:cSld>
@@ -8043,4 +10550,299 @@
     </a:ext>
   </a:extLst>
 </a:theme>
+</file>
+
+<file path=ppt/theme/theme2.xml><?xml version="1.0" encoding="utf-8"?>
+<a:theme xmlns:a="http://schemas.openxmlformats.org/drawingml/2006/main" name="Office Theme">
+  <a:themeElements>
+    <a:clrScheme name="Office">
+      <a:dk1>
+        <a:sysClr val="windowText" lastClr="000000"/>
+      </a:dk1>
+      <a:lt1>
+        <a:sysClr val="window" lastClr="FFFFFF"/>
+      </a:lt1>
+      <a:dk2>
+        <a:srgbClr val="44546A"/>
+      </a:dk2>
+      <a:lt2>
+        <a:srgbClr val="E7E6E6"/>
+      </a:lt2>
+      <a:accent1>
+        <a:srgbClr val="4472C4"/>
+      </a:accent1>
+      <a:accent2>
+        <a:srgbClr val="ED7D31"/>
+      </a:accent2>
+      <a:accent3>
+        <a:srgbClr val="A5A5A5"/>
+      </a:accent3>
+      <a:accent4>
+        <a:srgbClr val="FFC000"/>
+      </a:accent4>
+      <a:accent5>
+        <a:srgbClr val="5B9BD5"/>
+      </a:accent5>
+      <a:accent6>
+        <a:srgbClr val="70AD47"/>
+      </a:accent6>
+      <a:hlink>
+        <a:srgbClr val="0563C1"/>
+      </a:hlink>
+      <a:folHlink>
+        <a:srgbClr val="954F72"/>
+      </a:folHlink>
+    </a:clrScheme>
+    <a:fontScheme name="Office">
+      <a:majorFont>
+        <a:latin typeface="Calibri Light" panose="020F0302020204030204"/>
+        <a:ea typeface=""/>
+        <a:cs typeface=""/>
+        <a:font script="Jpan" typeface="游ゴシック Light"/>
+        <a:font script="Hang" typeface="맑은 고딕"/>
+        <a:font script="Hans" typeface="等线 Light"/>
+        <a:font script="Hant" typeface="新細明體"/>
+        <a:font script="Arab" typeface="Times New Roman"/>
+        <a:font script="Hebr" typeface="Times New Roman"/>
+        <a:font script="Thai" typeface="Angsana New"/>
+        <a:font script="Ethi" typeface="Nyala"/>
+        <a:font script="Beng" typeface="Vrinda"/>
+        <a:font script="Gujr" typeface="Shruti"/>
+        <a:font script="Khmr" typeface="MoolBoran"/>
+        <a:font script="Knda" typeface="Tunga"/>
+        <a:font script="Guru" typeface="Raavi"/>
+        <a:font script="Cans" typeface="Euphemia"/>
+        <a:font script="Cher" typeface="Plantagenet Cherokee"/>
+        <a:font script="Yiii" typeface="Microsoft Yi Baiti"/>
+        <a:font script="Tibt" typeface="Microsoft Himalaya"/>
+        <a:font script="Thaa" typeface="MV Boli"/>
+        <a:font script="Deva" typeface="Mangal"/>
+        <a:font script="Telu" typeface="Gautami"/>
+        <a:font script="Taml" typeface="Latha"/>
+        <a:font script="Syrc" typeface="Estrangelo Edessa"/>
+        <a:font script="Orya" typeface="Kalinga"/>
+        <a:font script="Mlym" typeface="Kartika"/>
+        <a:font script="Laoo" typeface="DokChampa"/>
+        <a:font script="Sinh" typeface="Iskoola Pota"/>
+        <a:font script="Mong" typeface="Mongolian Baiti"/>
+        <a:font script="Viet" typeface="Times New Roman"/>
+        <a:font script="Uigh" typeface="Microsoft Uighur"/>
+        <a:font script="Geor" typeface="Sylfaen"/>
+        <a:font script="Armn" typeface="Arial"/>
+        <a:font script="Bugi" typeface="Leelawadee UI"/>
+        <a:font script="Bopo" typeface="Microsoft JhengHei"/>
+        <a:font script="Java" typeface="Javanese Text"/>
+        <a:font script="Lisu" typeface="Segoe UI"/>
+        <a:font script="Mymr" typeface="Myanmar Text"/>
+        <a:font script="Nkoo" typeface="Ebrima"/>
+        <a:font script="Olck" typeface="Nirmala UI"/>
+        <a:font script="Osma" typeface="Ebrima"/>
+        <a:font script="Phag" typeface="Phagspa"/>
+        <a:font script="Syrn" typeface="Estrangelo Edessa"/>
+        <a:font script="Syrj" typeface="Estrangelo Edessa"/>
+        <a:font script="Syre" typeface="Estrangelo Edessa"/>
+        <a:font script="Sora" typeface="Nirmala UI"/>
+        <a:font script="Tale" typeface="Microsoft Tai Le"/>
+        <a:font script="Talu" typeface="Microsoft New Tai Lue"/>
+        <a:font script="Tfng" typeface="Ebrima"/>
+      </a:majorFont>
+      <a:minorFont>
+        <a:latin typeface="Calibri" panose="020F0502020204030204"/>
+        <a:ea typeface=""/>
+        <a:cs typeface=""/>
+        <a:font script="Jpan" typeface="游ゴシック"/>
+        <a:font script="Hang" typeface="맑은 고딕"/>
+        <a:font script="Hans" typeface="等线"/>
+        <a:font script="Hant" typeface="新細明體"/>
+        <a:font script="Arab" typeface="Arial"/>
+        <a:font script="Hebr" typeface="Arial"/>
+        <a:font script="Thai" typeface="Cordia New"/>
+        <a:font script="Ethi" typeface="Nyala"/>
+        <a:font script="Beng" typeface="Vrinda"/>
+        <a:font script="Gujr" typeface="Shruti"/>
+        <a:font script="Khmr" typeface="DaunPenh"/>
+        <a:font script="Knda" typeface="Tunga"/>
+        <a:font script="Guru" typeface="Raavi"/>
+        <a:font script="Cans" typeface="Euphemia"/>
+        <a:font script="Cher" typeface="Plantagenet Cherokee"/>
+        <a:font script="Yiii" typeface="Microsoft Yi Baiti"/>
+        <a:font script="Tibt" typeface="Microsoft Himalaya"/>
+        <a:font script="Thaa" typeface="MV Boli"/>
+        <a:font script="Deva" typeface="Mangal"/>
+        <a:font script="Telu" typeface="Gautami"/>
+        <a:font script="Taml" typeface="Latha"/>
+        <a:font script="Syrc" typeface="Estrangelo Edessa"/>
+        <a:font script="Orya" typeface="Kalinga"/>
+        <a:font script="Mlym" typeface="Kartika"/>
+        <a:font script="Laoo" typeface="DokChampa"/>
+        <a:font script="Sinh" typeface="Iskoola Pota"/>
+        <a:font script="Mong" typeface="Mongolian Baiti"/>
+        <a:font script="Viet" typeface="Arial"/>
+        <a:font script="Uigh" typeface="Microsoft Uighur"/>
+        <a:font script="Geor" typeface="Sylfaen"/>
+        <a:font script="Armn" typeface="Arial"/>
+        <a:font script="Bugi" typeface="Leelawadee UI"/>
+        <a:font script="Bopo" typeface="Microsoft JhengHei"/>
+        <a:font script="Java" typeface="Javanese Text"/>
+        <a:font script="Lisu" typeface="Segoe UI"/>
+        <a:font script="Mymr" typeface="Myanmar Text"/>
+        <a:font script="Nkoo" typeface="Ebrima"/>
+        <a:font script="Olck" typeface="Nirmala UI"/>
+        <a:font script="Osma" typeface="Ebrima"/>
+        <a:font script="Phag" typeface="Phagspa"/>
+        <a:font script="Syrn" typeface="Estrangelo Edessa"/>
+        <a:font script="Syrj" typeface="Estrangelo Edessa"/>
+        <a:font script="Syre" typeface="Estrangelo Edessa"/>
+        <a:font script="Sora" typeface="Nirmala UI"/>
+        <a:font script="Tale" typeface="Microsoft Tai Le"/>
+        <a:font script="Talu" typeface="Microsoft New Tai Lue"/>
+        <a:font script="Tfng" typeface="Ebrima"/>
+      </a:minorFont>
+    </a:fontScheme>
+    <a:fmtScheme name="Office">
+      <a:fillStyleLst>
+        <a:solidFill>
+          <a:schemeClr val="phClr"/>
+        </a:solidFill>
+        <a:gradFill rotWithShape="1">
+          <a:gsLst>
+            <a:gs pos="0">
+              <a:schemeClr val="phClr">
+                <a:lumMod val="110000"/>
+                <a:satMod val="105000"/>
+                <a:tint val="67000"/>
+              </a:schemeClr>
+            </a:gs>
+            <a:gs pos="50000">
+              <a:schemeClr val="phClr">
+                <a:lumMod val="105000"/>
+                <a:satMod val="103000"/>
+                <a:tint val="73000"/>
+              </a:schemeClr>
+            </a:gs>
+            <a:gs pos="100000">
+              <a:schemeClr val="phClr">
+                <a:lumMod val="105000"/>
+                <a:satMod val="109000"/>
+                <a:tint val="81000"/>
+              </a:schemeClr>
+            </a:gs>
+          </a:gsLst>
+          <a:lin ang="5400000" scaled="0"/>
+        </a:gradFill>
+        <a:gradFill rotWithShape="1">
+          <a:gsLst>
+            <a:gs pos="0">
+              <a:schemeClr val="phClr">
+                <a:satMod val="103000"/>
+                <a:lumMod val="102000"/>
+                <a:tint val="94000"/>
+              </a:schemeClr>
+            </a:gs>
+            <a:gs pos="50000">
+              <a:schemeClr val="phClr">
+                <a:satMod val="110000"/>
+                <a:lumMod val="100000"/>
+                <a:shade val="100000"/>
+              </a:schemeClr>
+            </a:gs>
+            <a:gs pos="100000">
+              <a:schemeClr val="phClr">
+                <a:lumMod val="99000"/>
+                <a:satMod val="120000"/>
+                <a:shade val="78000"/>
+              </a:schemeClr>
+            </a:gs>
+          </a:gsLst>
+          <a:lin ang="5400000" scaled="0"/>
+        </a:gradFill>
+      </a:fillStyleLst>
+      <a:lnStyleLst>
+        <a:ln w="6350" cap="flat" cmpd="sng" algn="ctr">
+          <a:solidFill>
+            <a:schemeClr val="phClr"/>
+          </a:solidFill>
+          <a:prstDash val="solid"/>
+          <a:miter lim="800000"/>
+        </a:ln>
+        <a:ln w="12700" cap="flat" cmpd="sng" algn="ctr">
+          <a:solidFill>
+            <a:schemeClr val="phClr"/>
+          </a:solidFill>
+          <a:prstDash val="solid"/>
+          <a:miter lim="800000"/>
+        </a:ln>
+        <a:ln w="19050" cap="flat" cmpd="sng" algn="ctr">
+          <a:solidFill>
+            <a:schemeClr val="phClr"/>
+          </a:solidFill>
+          <a:prstDash val="solid"/>
+          <a:miter lim="800000"/>
+        </a:ln>
+      </a:lnStyleLst>
+      <a:effectStyleLst>
+        <a:effectStyle>
+          <a:effectLst/>
+        </a:effectStyle>
+        <a:effectStyle>
+          <a:effectLst/>
+        </a:effectStyle>
+        <a:effectStyle>
+          <a:effectLst>
+            <a:outerShdw blurRad="57150" dist="19050" dir="5400000" algn="ctr" rotWithShape="0">
+              <a:srgbClr val="000000">
+                <a:alpha val="63000"/>
+              </a:srgbClr>
+            </a:outerShdw>
+          </a:effectLst>
+        </a:effectStyle>
+      </a:effectStyleLst>
+      <a:bgFillStyleLst>
+        <a:solidFill>
+          <a:schemeClr val="phClr"/>
+        </a:solidFill>
+        <a:solidFill>
+          <a:schemeClr val="phClr">
+            <a:tint val="95000"/>
+            <a:satMod val="170000"/>
+          </a:schemeClr>
+        </a:solidFill>
+        <a:gradFill rotWithShape="1">
+          <a:gsLst>
+            <a:gs pos="0">
+              <a:schemeClr val="phClr">
+                <a:tint val="93000"/>
+                <a:satMod val="150000"/>
+                <a:shade val="98000"/>
+                <a:lumMod val="102000"/>
+              </a:schemeClr>
+            </a:gs>
+            <a:gs pos="50000">
+              <a:schemeClr val="phClr">
+                <a:tint val="98000"/>
+                <a:satMod val="130000"/>
+                <a:shade val="90000"/>
+                <a:lumMod val="103000"/>
+              </a:schemeClr>
+            </a:gs>
+            <a:gs pos="100000">
+              <a:schemeClr val="phClr">
+                <a:shade val="63000"/>
+                <a:satMod val="120000"/>
+              </a:schemeClr>
+            </a:gs>
+          </a:gsLst>
+          <a:lin ang="5400000" scaled="0"/>
+        </a:gradFill>
+      </a:bgFillStyleLst>
+    </a:fmtScheme>
+  </a:themeElements>
+  <a:objectDefaults/>
+  <a:extraClrSchemeLst/>
+  <a:extLst>
+    <a:ext uri="{05A4C25C-085E-4340-85A3-A5531E510DB2}">
+      <thm15:themeFamily xmlns:thm15="http://schemas.microsoft.com/office/thememl/2012/main" name="Office Theme" id="{62F939B6-93AF-4DB8-9C6B-D6C7DFDC589F}" vid="{4A3C46E8-61CC-4603-A589-7422A47A8E4A}"/>
+    </a:ext>
+  </a:extLst>
+</a:theme>
 </file>
</xml_diff>